<commit_message>
change of first slide format
</commit_message>
<xml_diff>
--- a/Cabs/Data_Glacier_GM2_JAIME_LEON.pptx
+++ b/Cabs/Data_Glacier_GM2_JAIME_LEON.pptx
@@ -5,24 +5,25 @@
     <p:sldMasterId id="2147483648" r:id="rId1"/>
   </p:sldMasterIdLst>
   <p:notesMasterIdLst>
-    <p:notesMasterId r:id="rId17"/>
+    <p:notesMasterId r:id="rId18"/>
   </p:notesMasterIdLst>
   <p:sldIdLst>
     <p:sldId id="258" r:id="rId2"/>
-    <p:sldId id="259" r:id="rId3"/>
-    <p:sldId id="261" r:id="rId4"/>
-    <p:sldId id="262" r:id="rId5"/>
-    <p:sldId id="263" r:id="rId6"/>
-    <p:sldId id="264" r:id="rId7"/>
-    <p:sldId id="265" r:id="rId8"/>
-    <p:sldId id="270" r:id="rId9"/>
-    <p:sldId id="266" r:id="rId10"/>
-    <p:sldId id="267" r:id="rId11"/>
-    <p:sldId id="268" r:id="rId12"/>
-    <p:sldId id="269" r:id="rId13"/>
-    <p:sldId id="271" r:id="rId14"/>
-    <p:sldId id="272" r:id="rId15"/>
-    <p:sldId id="273" r:id="rId16"/>
+    <p:sldId id="274" r:id="rId3"/>
+    <p:sldId id="259" r:id="rId4"/>
+    <p:sldId id="261" r:id="rId5"/>
+    <p:sldId id="262" r:id="rId6"/>
+    <p:sldId id="263" r:id="rId7"/>
+    <p:sldId id="264" r:id="rId8"/>
+    <p:sldId id="265" r:id="rId9"/>
+    <p:sldId id="270" r:id="rId10"/>
+    <p:sldId id="266" r:id="rId11"/>
+    <p:sldId id="267" r:id="rId12"/>
+    <p:sldId id="268" r:id="rId13"/>
+    <p:sldId id="269" r:id="rId14"/>
+    <p:sldId id="271" r:id="rId15"/>
+    <p:sldId id="272" r:id="rId16"/>
+    <p:sldId id="273" r:id="rId17"/>
   </p:sldIdLst>
   <p:sldSz cx="12192000" cy="6858000"/>
   <p:notesSz cx="6858000" cy="9144000"/>
@@ -211,7 +212,7 @@
           <a:p>
             <a:fld id="{A5C20BB3-3CCB-4FE5-991B-82F6BCB48AF3}" type="datetimeFigureOut">
               <a:rPr lang="en-US" smtClean="0"/>
-              <a:t>3/7/21</a:t>
+              <a:t>3/12/21</a:t>
             </a:fld>
             <a:endParaRPr lang="en-US"/>
           </a:p>
@@ -576,7 +577,7 @@
           <a:p>
             <a:fld id="{E0746DE6-3336-457D-A091-FA20AC1C536E}" type="slidenum">
               <a:rPr lang="en-US" smtClean="0"/>
-              <a:t>6</a:t>
+              <a:t>7</a:t>
             </a:fld>
             <a:endParaRPr lang="en-US"/>
           </a:p>
@@ -693,7 +694,7 @@
           <a:p>
             <a:fld id="{E0746DE6-3336-457D-A091-FA20AC1C536E}" type="slidenum">
               <a:rPr lang="en-US" smtClean="0"/>
-              <a:t>7</a:t>
+              <a:t>8</a:t>
             </a:fld>
             <a:endParaRPr lang="en-US"/>
           </a:p>
@@ -800,7 +801,7 @@
           <a:p>
             <a:fld id="{E0746DE6-3336-457D-A091-FA20AC1C536E}" type="slidenum">
               <a:rPr lang="en-US" smtClean="0"/>
-              <a:t>9</a:t>
+              <a:t>10</a:t>
             </a:fld>
             <a:endParaRPr lang="en-US"/>
           </a:p>
@@ -966,7 +967,7 @@
           <a:p>
             <a:fld id="{5D6495F3-B757-4FAF-98AA-EDA7D1485485}" type="datetimeFigureOut">
               <a:rPr lang="en-US" smtClean="0"/>
-              <a:t>3/7/21</a:t>
+              <a:t>3/12/21</a:t>
             </a:fld>
             <a:endParaRPr lang="en-US"/>
           </a:p>
@@ -1164,7 +1165,7 @@
           <a:p>
             <a:fld id="{5D6495F3-B757-4FAF-98AA-EDA7D1485485}" type="datetimeFigureOut">
               <a:rPr lang="en-US" smtClean="0"/>
-              <a:t>3/7/21</a:t>
+              <a:t>3/12/21</a:t>
             </a:fld>
             <a:endParaRPr lang="en-US"/>
           </a:p>
@@ -1372,7 +1373,7 @@
           <a:p>
             <a:fld id="{5D6495F3-B757-4FAF-98AA-EDA7D1485485}" type="datetimeFigureOut">
               <a:rPr lang="en-US" smtClean="0"/>
-              <a:t>3/7/21</a:t>
+              <a:t>3/12/21</a:t>
             </a:fld>
             <a:endParaRPr lang="en-US"/>
           </a:p>
@@ -1570,7 +1571,7 @@
           <a:p>
             <a:fld id="{5D6495F3-B757-4FAF-98AA-EDA7D1485485}" type="datetimeFigureOut">
               <a:rPr lang="en-US" smtClean="0"/>
-              <a:t>3/7/21</a:t>
+              <a:t>3/12/21</a:t>
             </a:fld>
             <a:endParaRPr lang="en-US"/>
           </a:p>
@@ -1845,7 +1846,7 @@
           <a:p>
             <a:fld id="{5D6495F3-B757-4FAF-98AA-EDA7D1485485}" type="datetimeFigureOut">
               <a:rPr lang="en-US" smtClean="0"/>
-              <a:t>3/7/21</a:t>
+              <a:t>3/12/21</a:t>
             </a:fld>
             <a:endParaRPr lang="en-US"/>
           </a:p>
@@ -2110,7 +2111,7 @@
           <a:p>
             <a:fld id="{5D6495F3-B757-4FAF-98AA-EDA7D1485485}" type="datetimeFigureOut">
               <a:rPr lang="en-US" smtClean="0"/>
-              <a:t>3/7/21</a:t>
+              <a:t>3/12/21</a:t>
             </a:fld>
             <a:endParaRPr lang="en-US"/>
           </a:p>
@@ -2522,7 +2523,7 @@
           <a:p>
             <a:fld id="{5D6495F3-B757-4FAF-98AA-EDA7D1485485}" type="datetimeFigureOut">
               <a:rPr lang="en-US" smtClean="0"/>
-              <a:t>3/7/21</a:t>
+              <a:t>3/12/21</a:t>
             </a:fld>
             <a:endParaRPr lang="en-US"/>
           </a:p>
@@ -2663,7 +2664,7 @@
           <a:p>
             <a:fld id="{5D6495F3-B757-4FAF-98AA-EDA7D1485485}" type="datetimeFigureOut">
               <a:rPr lang="en-US" smtClean="0"/>
-              <a:t>3/7/21</a:t>
+              <a:t>3/12/21</a:t>
             </a:fld>
             <a:endParaRPr lang="en-US"/>
           </a:p>
@@ -2776,7 +2777,7 @@
           <a:p>
             <a:fld id="{5D6495F3-B757-4FAF-98AA-EDA7D1485485}" type="datetimeFigureOut">
               <a:rPr lang="en-US" smtClean="0"/>
-              <a:t>3/7/21</a:t>
+              <a:t>3/12/21</a:t>
             </a:fld>
             <a:endParaRPr lang="en-US"/>
           </a:p>
@@ -3087,7 +3088,7 @@
           <a:p>
             <a:fld id="{5D6495F3-B757-4FAF-98AA-EDA7D1485485}" type="datetimeFigureOut">
               <a:rPr lang="en-US" smtClean="0"/>
-              <a:t>3/7/21</a:t>
+              <a:t>3/12/21</a:t>
             </a:fld>
             <a:endParaRPr lang="en-US"/>
           </a:p>
@@ -3378,7 +3379,7 @@
           <a:p>
             <a:fld id="{5D6495F3-B757-4FAF-98AA-EDA7D1485485}" type="datetimeFigureOut">
               <a:rPr lang="en-US" smtClean="0"/>
-              <a:t>3/7/21</a:t>
+              <a:t>3/12/21</a:t>
             </a:fld>
             <a:endParaRPr lang="en-US"/>
           </a:p>
@@ -3619,7 +3620,7 @@
           <a:p>
             <a:fld id="{5D6495F3-B757-4FAF-98AA-EDA7D1485485}" type="datetimeFigureOut">
               <a:rPr lang="en-US" smtClean="0"/>
-              <a:t>3/7/21</a:t>
+              <a:t>3/12/21</a:t>
             </a:fld>
             <a:endParaRPr lang="en-US"/>
           </a:p>
@@ -4186,8 +4187,8 @@
         </p:nvSpPr>
         <p:spPr>
           <a:xfrm>
-            <a:off x="3045368" y="2043663"/>
-            <a:ext cx="6105194" cy="2031055"/>
+            <a:off x="3394044" y="1129262"/>
+            <a:ext cx="5403911" cy="2031055"/>
           </a:xfrm>
         </p:spPr>
         <p:txBody>
@@ -4231,7 +4232,7 @@
         </p:nvSpPr>
         <p:spPr>
           <a:xfrm>
-            <a:off x="3045368" y="4074718"/>
+            <a:off x="3043402" y="3160317"/>
             <a:ext cx="6105194" cy="682079"/>
           </a:xfrm>
         </p:spPr>
@@ -4264,6 +4265,105 @@
                 <a:srgbClr val="FFFFFF"/>
               </a:solidFill>
             </a:endParaRPr>
+          </a:p>
+        </p:txBody>
+      </p:sp>
+      <p:sp>
+        <p:nvSpPr>
+          <p:cNvPr id="4" name="TextBox 3">
+            <a:extLst>
+              <a:ext uri="{FF2B5EF4-FFF2-40B4-BE49-F238E27FC236}">
+                <a16:creationId xmlns:a16="http://schemas.microsoft.com/office/drawing/2014/main" id="{C4678FB3-30AB-3448-88D3-113DB08B5C09}"/>
+              </a:ext>
+            </a:extLst>
+          </p:cNvPr>
+          <p:cNvSpPr txBox="1"/>
+          <p:nvPr/>
+        </p:nvSpPr>
+        <p:spPr>
+          <a:xfrm>
+            <a:off x="4452257" y="4038600"/>
+            <a:ext cx="3657600" cy="1477328"/>
+          </a:xfrm>
+          <a:prstGeom prst="rect">
+            <a:avLst/>
+          </a:prstGeom>
+          <a:noFill/>
+        </p:spPr>
+        <p:txBody>
+          <a:bodyPr wrap="square" rtlCol="0">
+            <a:spAutoFit/>
+          </a:bodyPr>
+          <a:lstStyle/>
+          <a:p>
+            <a:r>
+              <a:rPr lang="en-US" dirty="0">
+                <a:solidFill>
+                  <a:schemeClr val="bg1"/>
+                </a:solidFill>
+              </a:rPr>
+              <a:t>Name : </a:t>
+            </a:r>
+            <a:r>
+              <a:rPr lang="en-US" b="1" dirty="0">
+                <a:solidFill>
+                  <a:schemeClr val="bg1"/>
+                </a:solidFill>
+                <a:hlinkClick r:id="rId3" tooltip="G2M insight for Cab Investment firm ( Must for all Specialization) ">
+                  <a:extLst>
+                    <a:ext uri="{A12FA001-AC4F-418D-AE19-62706E023703}">
+                      <ahyp:hlinkClr xmlns:ahyp="http://schemas.microsoft.com/office/drawing/2018/hyperlinkcolor" val="tx"/>
+                    </a:ext>
+                  </a:extLst>
+                </a:hlinkClick>
+              </a:rPr>
+              <a:t>G2M insight for Cab Investment firm</a:t>
+            </a:r>
+            <a:br>
+              <a:rPr lang="en-US" dirty="0">
+                <a:solidFill>
+                  <a:schemeClr val="bg1"/>
+                </a:solidFill>
+              </a:rPr>
+            </a:br>
+            <a:r>
+              <a:rPr lang="en-US" dirty="0">
+                <a:solidFill>
+                  <a:schemeClr val="bg1"/>
+                </a:solidFill>
+              </a:rPr>
+              <a:t>Location: Mexico, Mexico</a:t>
+            </a:r>
+            <a:br>
+              <a:rPr lang="en-US" dirty="0">
+                <a:solidFill>
+                  <a:schemeClr val="bg1"/>
+                </a:solidFill>
+              </a:rPr>
+            </a:br>
+            <a:r>
+              <a:rPr lang="en-US" dirty="0">
+                <a:solidFill>
+                  <a:schemeClr val="bg1"/>
+                </a:solidFill>
+              </a:rPr>
+              <a:t>Team: Data and analytics</a:t>
+            </a:r>
+            <a:br>
+              <a:rPr lang="en-US" dirty="0">
+                <a:solidFill>
+                  <a:schemeClr val="bg1"/>
+                </a:solidFill>
+              </a:rPr>
+            </a:br>
+            <a:r>
+              <a:rPr lang="en-US" dirty="0">
+                <a:solidFill>
+                  <a:schemeClr val="bg1"/>
+                </a:solidFill>
+              </a:rPr>
+              <a:t>Date: 11-March-2021</a:t>
+            </a:r>
           </a:p>
         </p:txBody>
       </p:sp>
@@ -4307,10 +4407,10 @@
       </p:grpSpPr>
       <p:sp>
         <p:nvSpPr>
-          <p:cNvPr id="26" name="Rectangle 25">
-            <a:extLst>
-              <a:ext uri="{FF2B5EF4-FFF2-40B4-BE49-F238E27FC236}">
-                <a16:creationId xmlns:a16="http://schemas.microsoft.com/office/drawing/2014/main" id="{6753252F-4873-4F63-801D-CC719279A7D5}"/>
+          <p:cNvPr id="9" name="Rectangle 8">
+            <a:extLst>
+              <a:ext uri="{FF2B5EF4-FFF2-40B4-BE49-F238E27FC236}">
+                <a16:creationId xmlns:a16="http://schemas.microsoft.com/office/drawing/2014/main" id="{23962611-DFD5-4092-AAFD-559E3DFCE2C9}"/>
               </a:ext>
               <a:ext uri="{C183D7F6-B498-43B3-948B-1728B52AA6E4}">
                 <adec:decorative xmlns:adec="http://schemas.microsoft.com/office/drawing/2017/decorative" val="1"/>
@@ -4330,15 +4430,37 @@
         </p:nvSpPr>
         <p:spPr>
           <a:xfrm>
-            <a:off x="0" y="0"/>
-            <a:ext cx="12192000" cy="6858000"/>
+            <a:off x="475488" y="0"/>
+            <a:ext cx="10910292" cy="6858000"/>
           </a:xfrm>
           <a:prstGeom prst="rect">
             <a:avLst/>
           </a:prstGeom>
-          <a:solidFill>
-            <a:srgbClr val="FFFFFF"/>
-          </a:solidFill>
+          <a:gradFill>
+            <a:gsLst>
+              <a:gs pos="0">
+                <a:schemeClr val="accent1">
+                  <a:lumMod val="90000"/>
+                </a:schemeClr>
+              </a:gs>
+              <a:gs pos="25000">
+                <a:schemeClr val="accent1">
+                  <a:lumMod val="90000"/>
+                </a:schemeClr>
+              </a:gs>
+              <a:gs pos="94000">
+                <a:schemeClr val="bg2">
+                  <a:lumMod val="25000"/>
+                </a:schemeClr>
+              </a:gs>
+              <a:gs pos="100000">
+                <a:schemeClr val="bg2">
+                  <a:lumMod val="25000"/>
+                </a:schemeClr>
+              </a:gs>
+            </a:gsLst>
+            <a:lin ang="4200000" scaled="0"/>
+          </a:gradFill>
           <a:ln>
             <a:noFill/>
           </a:ln>
@@ -4368,21 +4490,21 @@
           </a:p>
         </p:txBody>
       </p:sp>
-      <p:sp>
-        <p:nvSpPr>
-          <p:cNvPr id="28" name="Rectangle 27">
-            <a:extLst>
-              <a:ext uri="{FF2B5EF4-FFF2-40B4-BE49-F238E27FC236}">
-                <a16:creationId xmlns:a16="http://schemas.microsoft.com/office/drawing/2014/main" id="{047C8CCB-F95D-4249-92DD-651249D3535A}"/>
+      <p:pic>
+        <p:nvPicPr>
+          <p:cNvPr id="11" name="Picture 10">
+            <a:extLst>
+              <a:ext uri="{FF2B5EF4-FFF2-40B4-BE49-F238E27FC236}">
+                <a16:creationId xmlns:a16="http://schemas.microsoft.com/office/drawing/2014/main" id="{2270F1FA-0425-408F-9861-80BF5AFB276D}"/>
               </a:ext>
               <a:ext uri="{C183D7F6-B498-43B3-948B-1728B52AA6E4}">
                 <adec:decorative xmlns:adec="http://schemas.microsoft.com/office/drawing/2017/decorative" val="1"/>
               </a:ext>
             </a:extLst>
           </p:cNvPr>
-          <p:cNvSpPr>
-            <a:spLocks noGrp="1" noRot="1" noChangeAspect="1" noMove="1" noResize="1" noEditPoints="1" noAdjustHandles="1" noChangeArrowheads="1" noChangeShapeType="1" noTextEdit="1"/>
-          </p:cNvSpPr>
+          <p:cNvPicPr>
+            <a:picLocks noGrp="1" noRot="1" noChangeAspect="1" noMove="1" noResize="1" noEditPoints="1" noAdjustHandles="1" noChangeArrowheads="1" noChangeShapeType="1" noCrop="1"/>
+          </p:cNvPicPr>
           <p:nvPr>
             <p:extLst>
               <p:ext uri="{386F3935-93C4-4BCD-93E2-E3B085C9AB24}">
@@ -4390,47 +4512,29 @@
               </p:ext>
             </p:extLst>
           </p:nvPr>
-        </p:nvSpPr>
+        </p:nvPicPr>
+        <p:blipFill>
+          <a:blip r:embed="rId3">
+            <a:extLst>
+              <a:ext uri="{28A0092B-C50C-407E-A947-70E740481C1C}">
+                <a14:useLocalDpi xmlns:a14="http://schemas.microsoft.com/office/drawing/2010/main" val="0"/>
+              </a:ext>
+            </a:extLst>
+          </a:blip>
+          <a:stretch>
+            <a:fillRect/>
+          </a:stretch>
+        </p:blipFill>
         <p:spPr>
           <a:xfrm>
             <a:off x="0" y="0"/>
-            <a:ext cx="2013557" cy="6858000"/>
+            <a:ext cx="12192000" cy="6858000"/>
           </a:xfrm>
           <a:prstGeom prst="rect">
             <a:avLst/>
           </a:prstGeom>
-          <a:solidFill>
-            <a:srgbClr val="7F7F7F"/>
-          </a:solidFill>
-          <a:ln>
-            <a:noFill/>
-          </a:ln>
-        </p:spPr>
-        <p:style>
-          <a:lnRef idx="2">
-            <a:schemeClr val="accent1">
-              <a:shade val="50000"/>
-            </a:schemeClr>
-          </a:lnRef>
-          <a:fillRef idx="1">
-            <a:schemeClr val="accent1"/>
-          </a:fillRef>
-          <a:effectRef idx="0">
-            <a:schemeClr val="accent1"/>
-          </a:effectRef>
-          <a:fontRef idx="minor">
-            <a:schemeClr val="lt1"/>
-          </a:fontRef>
-        </p:style>
-        <p:txBody>
-          <a:bodyPr rtlCol="0" anchor="ctr"/>
-          <a:lstStyle/>
-          <a:p>
-            <a:pPr algn="ctr"/>
-            <a:endParaRPr lang="en-US"/>
-          </a:p>
-        </p:txBody>
-      </p:sp>
+        </p:spPr>
+      </p:pic>
       <p:sp>
         <p:nvSpPr>
           <p:cNvPr id="2" name="Title 1"/>
@@ -4443,30 +4547,19 @@
         </p:nvSpPr>
         <p:spPr>
           <a:xfrm>
-            <a:off x="640080" y="2074363"/>
-            <a:ext cx="2752354" cy="2709275"/>
-          </a:xfrm>
-          <a:prstGeom prst="ellipse">
-            <a:avLst/>
-          </a:prstGeom>
-          <a:solidFill>
-            <a:srgbClr val="262626"/>
-          </a:solidFill>
-          <a:ln w="174625" cmpd="thinThick">
-            <a:solidFill>
-              <a:srgbClr val="262626"/>
-            </a:solidFill>
-          </a:ln>
-        </p:spPr>
-        <p:txBody>
-          <a:bodyPr vert="horz" lIns="91440" tIns="45720" rIns="91440" bIns="45720" rtlCol="0" anchor="ctr">
+            <a:off x="3045368" y="2043663"/>
+            <a:ext cx="6105194" cy="2031055"/>
+          </a:xfrm>
+        </p:spPr>
+        <p:txBody>
+          <a:bodyPr vert="horz" lIns="91440" tIns="45720" rIns="91440" bIns="45720" rtlCol="0" anchor="b">
             <a:normAutofit/>
           </a:bodyPr>
           <a:lstStyle/>
           <a:p>
             <a:pPr algn="ctr"/>
             <a:r>
-              <a:rPr lang="en-US" sz="2600" kern="1200" dirty="0">
+              <a:rPr lang="en-US" sz="6000" kern="1200" dirty="0">
                 <a:solidFill>
                   <a:srgbClr val="FFFFFF"/>
                 </a:solidFill>
@@ -4474,93 +4567,7 @@
                 <a:ea typeface="+mj-ea"/>
                 <a:cs typeface="+mj-cs"/>
               </a:rPr>
-              <a:t>Age Group for </a:t>
-            </a:r>
-            <a:r>
-              <a:rPr lang="en-US" sz="2600" kern="1200" dirty="0" err="1">
-                <a:solidFill>
-                  <a:srgbClr val="FFFFFF"/>
-                </a:solidFill>
-                <a:latin typeface="+mj-lt"/>
-                <a:ea typeface="+mj-ea"/>
-                <a:cs typeface="+mj-cs"/>
-              </a:rPr>
-              <a:t>GrossProfit</a:t>
-            </a:r>
-            <a:endParaRPr lang="en-US" sz="2600" kern="1200" dirty="0">
-              <a:solidFill>
-                <a:srgbClr val="FFFFFF"/>
-              </a:solidFill>
-              <a:latin typeface="+mj-lt"/>
-              <a:ea typeface="+mj-ea"/>
-              <a:cs typeface="+mj-cs"/>
-            </a:endParaRPr>
-          </a:p>
-        </p:txBody>
-      </p:sp>
-      <p:pic>
-        <p:nvPicPr>
-          <p:cNvPr id="4" name="Content Placeholder 3">
-            <a:extLst>
-              <a:ext uri="{FF2B5EF4-FFF2-40B4-BE49-F238E27FC236}">
-                <a16:creationId xmlns:a16="http://schemas.microsoft.com/office/drawing/2014/main" id="{18930CB7-58A0-AB4E-84DD-C335021623C9}"/>
-              </a:ext>
-            </a:extLst>
-          </p:cNvPr>
-          <p:cNvPicPr>
-            <a:picLocks noGrp="1" noChangeAspect="1"/>
-          </p:cNvPicPr>
-          <p:nvPr>
-            <p:ph idx="1"/>
-          </p:nvPr>
-        </p:nvPicPr>
-        <p:blipFill>
-          <a:blip r:embed="rId2"/>
-          <a:stretch>
-            <a:fillRect/>
-          </a:stretch>
-        </p:blipFill>
-        <p:spPr>
-          <a:xfrm>
-            <a:off x="5209231" y="961812"/>
-            <a:ext cx="4846936" cy="4930987"/>
-          </a:xfrm>
-          <a:prstGeom prst="rect">
-            <a:avLst/>
-          </a:prstGeom>
-        </p:spPr>
-      </p:pic>
-      <p:sp>
-        <p:nvSpPr>
-          <p:cNvPr id="5" name="TextBox 4">
-            <a:extLst>
-              <a:ext uri="{FF2B5EF4-FFF2-40B4-BE49-F238E27FC236}">
-                <a16:creationId xmlns:a16="http://schemas.microsoft.com/office/drawing/2014/main" id="{F9ECBB5A-A7AC-0E4A-8F0D-23BF5A260C81}"/>
-              </a:ext>
-            </a:extLst>
-          </p:cNvPr>
-          <p:cNvSpPr txBox="1"/>
-          <p:nvPr/>
-        </p:nvSpPr>
-        <p:spPr>
-          <a:xfrm>
-            <a:off x="2690037" y="287079"/>
-            <a:ext cx="2519194" cy="1754326"/>
-          </a:xfrm>
-          <a:prstGeom prst="rect">
-            <a:avLst/>
-          </a:prstGeom>
-          <a:noFill/>
-        </p:spPr>
-        <p:txBody>
-          <a:bodyPr wrap="square" rtlCol="0">
-            <a:spAutoFit/>
-          </a:bodyPr>
-          <a:lstStyle/>
-          <a:p>
-            <a:r>
-              <a:rPr lang="en-US" dirty="0"/>
-              <a:t>The age group for the whole data set are mostly people within 18-27 years old with a 32. 56%, followed by 27-36 years old with 28.04%.</a:t>
+              <a:t>Age group</a:t>
             </a:r>
           </a:p>
         </p:txBody>
@@ -4568,7 +4575,7 @@
     </p:spTree>
     <p:extLst>
       <p:ext uri="{BB962C8B-B14F-4D97-AF65-F5344CB8AC3E}">
-        <p14:creationId xmlns:p14="http://schemas.microsoft.com/office/powerpoint/2010/main" val="692558239"/>
+        <p14:creationId xmlns:p14="http://schemas.microsoft.com/office/powerpoint/2010/main" val="1334088900"/>
       </p:ext>
     </p:extLst>
   </p:cSld>
@@ -4603,12 +4610,12 @@
           <a:chExt cx="0" cy="0"/>
         </a:xfrm>
       </p:grpSpPr>
-      <p:sp useBgFill="1">
-        <p:nvSpPr>
-          <p:cNvPr id="48" name="Rectangle 47">
-            <a:extLst>
-              <a:ext uri="{FF2B5EF4-FFF2-40B4-BE49-F238E27FC236}">
-                <a16:creationId xmlns:a16="http://schemas.microsoft.com/office/drawing/2014/main" id="{614141FC-8189-47F8-821A-FC9A4E91E039}"/>
+      <p:sp>
+        <p:nvSpPr>
+          <p:cNvPr id="26" name="Rectangle 25">
+            <a:extLst>
+              <a:ext uri="{FF2B5EF4-FFF2-40B4-BE49-F238E27FC236}">
+                <a16:creationId xmlns:a16="http://schemas.microsoft.com/office/drawing/2014/main" id="{6753252F-4873-4F63-801D-CC719279A7D5}"/>
               </a:ext>
               <a:ext uri="{C183D7F6-B498-43B3-948B-1728B52AA6E4}">
                 <adec:decorative xmlns:adec="http://schemas.microsoft.com/office/drawing/2017/decorative" val="1"/>
@@ -4634,6 +4641,9 @@
           <a:prstGeom prst="rect">
             <a:avLst/>
           </a:prstGeom>
+          <a:solidFill>
+            <a:srgbClr val="FFFFFF"/>
+          </a:solidFill>
           <a:ln>
             <a:noFill/>
           </a:ln>
@@ -4663,12 +4673,12 @@
           </a:p>
         </p:txBody>
       </p:sp>
-      <p:sp useBgFill="1">
-        <p:nvSpPr>
-          <p:cNvPr id="50" name="Rectangle 49">
-            <a:extLst>
-              <a:ext uri="{FF2B5EF4-FFF2-40B4-BE49-F238E27FC236}">
-                <a16:creationId xmlns:a16="http://schemas.microsoft.com/office/drawing/2014/main" id="{C062E60F-5CD4-4268-8359-8076634680E5}"/>
+      <p:sp>
+        <p:nvSpPr>
+          <p:cNvPr id="28" name="Rectangle 27">
+            <a:extLst>
+              <a:ext uri="{FF2B5EF4-FFF2-40B4-BE49-F238E27FC236}">
+                <a16:creationId xmlns:a16="http://schemas.microsoft.com/office/drawing/2014/main" id="{047C8CCB-F95D-4249-92DD-651249D3535A}"/>
               </a:ext>
               <a:ext uri="{C183D7F6-B498-43B3-948B-1728B52AA6E4}">
                 <adec:decorative xmlns:adec="http://schemas.microsoft.com/office/drawing/2017/decorative" val="1"/>
@@ -4688,25 +4698,18 @@
         </p:nvSpPr>
         <p:spPr>
           <a:xfrm>
-            <a:off x="554416" y="288350"/>
-            <a:ext cx="11167447" cy="2089317"/>
+            <a:off x="0" y="0"/>
+            <a:ext cx="2013557" cy="6858000"/>
           </a:xfrm>
           <a:prstGeom prst="rect">
             <a:avLst/>
           </a:prstGeom>
-          <a:ln w="12700">
-            <a:solidFill>
-              <a:srgbClr val="DEDEDE"/>
-            </a:solidFill>
+          <a:solidFill>
+            <a:srgbClr val="7F7F7F"/>
+          </a:solidFill>
+          <a:ln>
+            <a:noFill/>
           </a:ln>
-          <a:effectLst>
-            <a:outerShdw blurRad="50800" dist="38100" dir="2700000" algn="tl" rotWithShape="0">
-              <a:schemeClr val="bg2">
-                <a:lumMod val="85000"/>
-                <a:alpha val="50000"/>
-              </a:schemeClr>
-            </a:outerShdw>
-          </a:effectLst>
         </p:spPr>
         <p:style>
           <a:lnRef idx="2">
@@ -4728,37 +4731,8 @@
           <a:bodyPr rtlCol="0" anchor="ctr"/>
           <a:lstStyle/>
           <a:p>
-            <a:pPr marL="0" marR="0" lvl="0" indent="0" algn="ctr" defTabSz="914400" rtl="0" eaLnBrk="1" fontAlgn="auto" latinLnBrk="0" hangingPunct="1">
-              <a:lnSpc>
-                <a:spcPct val="100000"/>
-              </a:lnSpc>
-              <a:spcBef>
-                <a:spcPts val="0"/>
-              </a:spcBef>
-              <a:spcAft>
-                <a:spcPts val="0"/>
-              </a:spcAft>
-              <a:buClrTx/>
-              <a:buSzTx/>
-              <a:buFontTx/>
-              <a:buNone/>
-              <a:tabLst/>
-              <a:defRPr/>
-            </a:pPr>
-            <a:endParaRPr kumimoji="0" lang="en-US" sz="1800" b="0" i="0" u="none" strike="noStrike" kern="1200" cap="none" spc="0" normalizeH="0" baseline="0" noProof="0">
-              <a:ln>
-                <a:noFill/>
-              </a:ln>
-              <a:solidFill>
-                <a:prstClr val="white"/>
-              </a:solidFill>
-              <a:effectLst/>
-              <a:uLnTx/>
-              <a:uFillTx/>
-              <a:latin typeface="Calibri" panose="020F0502020204030204"/>
-              <a:ea typeface="+mn-ea"/>
-              <a:cs typeface="+mn-cs"/>
-            </a:endParaRPr>
+            <a:pPr algn="ctr"/>
+            <a:endParaRPr lang="en-US"/>
           </a:p>
         </p:txBody>
       </p:sp>
@@ -4774,334 +4748,132 @@
         </p:nvSpPr>
         <p:spPr>
           <a:xfrm>
-            <a:off x="841248" y="510047"/>
-            <a:ext cx="3300984" cy="1645920"/>
-          </a:xfrm>
-        </p:spPr>
-        <p:txBody>
-          <a:bodyPr>
+            <a:off x="640080" y="2074363"/>
+            <a:ext cx="2752354" cy="2709275"/>
+          </a:xfrm>
+          <a:prstGeom prst="ellipse">
+            <a:avLst/>
+          </a:prstGeom>
+          <a:solidFill>
+            <a:srgbClr val="262626"/>
+          </a:solidFill>
+          <a:ln w="174625" cmpd="thinThick">
+            <a:solidFill>
+              <a:srgbClr val="262626"/>
+            </a:solidFill>
+          </a:ln>
+        </p:spPr>
+        <p:txBody>
+          <a:bodyPr vert="horz" lIns="91440" tIns="45720" rIns="91440" bIns="45720" rtlCol="0" anchor="ctr">
             <a:normAutofit/>
           </a:bodyPr>
           <a:lstStyle/>
           <a:p>
-            <a:r>
-              <a:rPr lang="en-US" sz="2800" dirty="0"/>
-              <a:t>% of users through the years.</a:t>
-            </a:r>
-          </a:p>
-        </p:txBody>
-      </p:sp>
-      <p:sp>
-        <p:nvSpPr>
-          <p:cNvPr id="52" name="Rectangle 51">
-            <a:extLst>
-              <a:ext uri="{FF2B5EF4-FFF2-40B4-BE49-F238E27FC236}">
-                <a16:creationId xmlns:a16="http://schemas.microsoft.com/office/drawing/2014/main" id="{BB341EC3-1810-4D33-BA3F-E2D0AA0ECFB6}"/>
-              </a:ext>
-              <a:ext uri="{C183D7F6-B498-43B3-948B-1728B52AA6E4}">
-                <adec:decorative xmlns:adec="http://schemas.microsoft.com/office/drawing/2017/decorative" val="1"/>
-              </a:ext>
-            </a:extLst>
-          </p:cNvPr>
-          <p:cNvSpPr>
-            <a:spLocks noGrp="1" noRot="1" noChangeAspect="1" noMove="1" noResize="1" noEditPoints="1" noAdjustHandles="1" noChangeArrowheads="1" noChangeShapeType="1" noTextEdit="1"/>
-          </p:cNvSpPr>
-          <p:nvPr>
-            <p:extLst>
-              <p:ext uri="{386F3935-93C4-4BCD-93E2-E3B085C9AB24}">
-                <p16:designElem xmlns:p16="http://schemas.microsoft.com/office/powerpoint/2015/main" val="1"/>
-              </p:ext>
-            </p:extLst>
-          </p:nvPr>
-        </p:nvSpPr>
+            <a:pPr algn="ctr"/>
+            <a:r>
+              <a:rPr lang="en-US" sz="2600" kern="1200" dirty="0">
+                <a:solidFill>
+                  <a:srgbClr val="FFFFFF"/>
+                </a:solidFill>
+                <a:latin typeface="+mj-lt"/>
+                <a:ea typeface="+mj-ea"/>
+                <a:cs typeface="+mj-cs"/>
+              </a:rPr>
+              <a:t>Age Group for </a:t>
+            </a:r>
+            <a:r>
+              <a:rPr lang="en-US" sz="2600" kern="1200" dirty="0" err="1">
+                <a:solidFill>
+                  <a:srgbClr val="FFFFFF"/>
+                </a:solidFill>
+                <a:latin typeface="+mj-lt"/>
+                <a:ea typeface="+mj-ea"/>
+                <a:cs typeface="+mj-cs"/>
+              </a:rPr>
+              <a:t>GrossProfit</a:t>
+            </a:r>
+            <a:endParaRPr lang="en-US" sz="2600" kern="1200" dirty="0">
+              <a:solidFill>
+                <a:srgbClr val="FFFFFF"/>
+              </a:solidFill>
+              <a:latin typeface="+mj-lt"/>
+              <a:ea typeface="+mj-ea"/>
+              <a:cs typeface="+mj-cs"/>
+            </a:endParaRPr>
+          </a:p>
+        </p:txBody>
+      </p:sp>
+      <p:pic>
+        <p:nvPicPr>
+          <p:cNvPr id="4" name="Content Placeholder 3">
+            <a:extLst>
+              <a:ext uri="{FF2B5EF4-FFF2-40B4-BE49-F238E27FC236}">
+                <a16:creationId xmlns:a16="http://schemas.microsoft.com/office/drawing/2014/main" id="{18930CB7-58A0-AB4E-84DD-C335021623C9}"/>
+              </a:ext>
+            </a:extLst>
+          </p:cNvPr>
+          <p:cNvPicPr>
+            <a:picLocks noGrp="1" noChangeAspect="1"/>
+          </p:cNvPicPr>
+          <p:nvPr>
+            <p:ph idx="1"/>
+          </p:nvPr>
+        </p:nvPicPr>
+        <p:blipFill>
+          <a:blip r:embed="rId2"/>
+          <a:stretch>
+            <a:fillRect/>
+          </a:stretch>
+        </p:blipFill>
         <p:spPr>
           <a:xfrm>
-            <a:off x="490408" y="980964"/>
-            <a:ext cx="128016" cy="704088"/>
+            <a:off x="5209231" y="961812"/>
+            <a:ext cx="4846936" cy="4930987"/>
           </a:xfrm>
           <a:prstGeom prst="rect">
             <a:avLst/>
           </a:prstGeom>
-          <a:solidFill>
-            <a:schemeClr val="accent2"/>
-          </a:solidFill>
-          <a:ln>
-            <a:noFill/>
-          </a:ln>
-        </p:spPr>
-        <p:style>
-          <a:lnRef idx="2">
-            <a:schemeClr val="accent1">
-              <a:shade val="50000"/>
-            </a:schemeClr>
-          </a:lnRef>
-          <a:fillRef idx="1">
-            <a:schemeClr val="accent1"/>
-          </a:fillRef>
-          <a:effectRef idx="0">
-            <a:schemeClr val="accent1"/>
-          </a:effectRef>
-          <a:fontRef idx="minor">
-            <a:schemeClr val="lt1"/>
-          </a:fontRef>
-        </p:style>
-        <p:txBody>
-          <a:bodyPr rtlCol="0" anchor="ctr"/>
-          <a:lstStyle/>
-          <a:p>
-            <a:pPr marL="0" marR="0" lvl="0" indent="0" algn="ctr" defTabSz="914400" rtl="0" eaLnBrk="1" fontAlgn="auto" latinLnBrk="0" hangingPunct="1">
-              <a:lnSpc>
-                <a:spcPct val="100000"/>
-              </a:lnSpc>
-              <a:spcBef>
-                <a:spcPts val="0"/>
-              </a:spcBef>
-              <a:spcAft>
-                <a:spcPts val="0"/>
-              </a:spcAft>
-              <a:buClrTx/>
-              <a:buSzTx/>
-              <a:buFontTx/>
-              <a:buNone/>
-              <a:tabLst/>
-              <a:defRPr/>
-            </a:pPr>
-            <a:endParaRPr kumimoji="0" lang="en-US" sz="1800" b="0" i="0" u="none" strike="noStrike" kern="1200" cap="none" spc="0" normalizeH="0" baseline="0" noProof="0" dirty="0">
-              <a:ln>
-                <a:noFill/>
-              </a:ln>
-              <a:solidFill>
-                <a:prstClr val="white"/>
-              </a:solidFill>
-              <a:effectLst/>
-              <a:uLnTx/>
-              <a:uFillTx/>
-              <a:latin typeface="Calibri" panose="020F0502020204030204"/>
-              <a:ea typeface="+mn-ea"/>
-              <a:cs typeface="+mn-cs"/>
-            </a:endParaRPr>
-          </a:p>
-        </p:txBody>
-      </p:sp>
-      <p:sp>
-        <p:nvSpPr>
-          <p:cNvPr id="54" name="Rectangle 53">
-            <a:extLst>
-              <a:ext uri="{FF2B5EF4-FFF2-40B4-BE49-F238E27FC236}">
-                <a16:creationId xmlns:a16="http://schemas.microsoft.com/office/drawing/2014/main" id="{10127CDE-2B99-47A8-BB3C-7D17519105E0}"/>
-              </a:ext>
-              <a:ext uri="{C183D7F6-B498-43B3-948B-1728B52AA6E4}">
-                <adec:decorative xmlns:adec="http://schemas.microsoft.com/office/drawing/2017/decorative" val="1"/>
-              </a:ext>
-            </a:extLst>
-          </p:cNvPr>
-          <p:cNvSpPr>
-            <a:spLocks noGrp="1" noRot="1" noChangeAspect="1" noMove="1" noResize="1" noEditPoints="1" noAdjustHandles="1" noChangeArrowheads="1" noChangeShapeType="1" noTextEdit="1"/>
-          </p:cNvSpPr>
-          <p:nvPr>
-            <p:extLst>
-              <p:ext uri="{386F3935-93C4-4BCD-93E2-E3B085C9AB24}">
-                <p16:designElem xmlns:p16="http://schemas.microsoft.com/office/powerpoint/2015/main" val="1"/>
-              </p:ext>
-            </p:extLst>
-          </p:nvPr>
-        </p:nvSpPr>
-        <p:spPr>
-          <a:xfrm rot="5400000">
-            <a:off x="3598164" y="1323863"/>
-            <a:ext cx="1463040" cy="18288"/>
+        </p:spPr>
+      </p:pic>
+      <p:sp>
+        <p:nvSpPr>
+          <p:cNvPr id="5" name="TextBox 4">
+            <a:extLst>
+              <a:ext uri="{FF2B5EF4-FFF2-40B4-BE49-F238E27FC236}">
+                <a16:creationId xmlns:a16="http://schemas.microsoft.com/office/drawing/2014/main" id="{F9ECBB5A-A7AC-0E4A-8F0D-23BF5A260C81}"/>
+              </a:ext>
+            </a:extLst>
+          </p:cNvPr>
+          <p:cNvSpPr txBox="1"/>
+          <p:nvPr/>
+        </p:nvSpPr>
+        <p:spPr>
+          <a:xfrm>
+            <a:off x="2690037" y="287079"/>
+            <a:ext cx="2519194" cy="1754326"/>
           </a:xfrm>
           <a:prstGeom prst="rect">
             <a:avLst/>
           </a:prstGeom>
-          <a:solidFill>
-            <a:srgbClr val="D5D5D5"/>
-          </a:solidFill>
-          <a:ln w="3175">
-            <a:noFill/>
-          </a:ln>
-          <a:effectLst/>
-        </p:spPr>
-        <p:style>
-          <a:lnRef idx="2">
-            <a:schemeClr val="accent1">
-              <a:shade val="50000"/>
-            </a:schemeClr>
-          </a:lnRef>
-          <a:fillRef idx="1">
-            <a:schemeClr val="accent1"/>
-          </a:fillRef>
-          <a:effectRef idx="0">
-            <a:schemeClr val="accent1"/>
-          </a:effectRef>
-          <a:fontRef idx="minor">
-            <a:schemeClr val="lt1"/>
-          </a:fontRef>
-        </p:style>
-        <p:txBody>
-          <a:bodyPr rtlCol="0" anchor="ctr"/>
-          <a:lstStyle/>
-          <a:p>
-            <a:pPr marL="0" marR="0" lvl="0" indent="0" algn="ctr" defTabSz="914400" rtl="0" eaLnBrk="1" fontAlgn="auto" latinLnBrk="0" hangingPunct="1">
-              <a:lnSpc>
-                <a:spcPct val="100000"/>
-              </a:lnSpc>
-              <a:spcBef>
-                <a:spcPts val="0"/>
-              </a:spcBef>
-              <a:spcAft>
-                <a:spcPts val="0"/>
-              </a:spcAft>
-              <a:buClrTx/>
-              <a:buSzTx/>
-              <a:buFontTx/>
-              <a:buNone/>
-              <a:tabLst/>
-              <a:defRPr/>
-            </a:pPr>
-            <a:endParaRPr kumimoji="0" lang="en-US" sz="1800" b="0" i="0" u="none" strike="noStrike" kern="1200" cap="none" spc="0" normalizeH="0" baseline="0" noProof="0">
-              <a:ln>
-                <a:noFill/>
-              </a:ln>
-              <a:solidFill>
-                <a:prstClr val="white"/>
-              </a:solidFill>
-              <a:effectLst/>
-              <a:uLnTx/>
-              <a:uFillTx/>
-              <a:latin typeface="Calibri" panose="020F0502020204030204"/>
-              <a:ea typeface="+mn-ea"/>
-              <a:cs typeface="+mn-cs"/>
-            </a:endParaRPr>
-          </a:p>
-        </p:txBody>
-      </p:sp>
-      <p:sp>
-        <p:nvSpPr>
-          <p:cNvPr id="3" name="Content Placeholder 2"/>
-          <p:cNvSpPr>
-            <a:spLocks noGrp="1"/>
-          </p:cNvSpPr>
-          <p:nvPr>
-            <p:ph idx="1"/>
-          </p:nvPr>
-        </p:nvSpPr>
-        <p:spPr>
-          <a:xfrm>
-            <a:off x="4581144" y="510047"/>
-            <a:ext cx="6858000" cy="1645920"/>
-          </a:xfrm>
-        </p:spPr>
-        <p:txBody>
-          <a:bodyPr anchor="ctr">
-            <a:normAutofit/>
+          <a:noFill/>
+        </p:spPr>
+        <p:txBody>
+          <a:bodyPr wrap="square" rtlCol="0">
+            <a:spAutoFit/>
           </a:bodyPr>
           <a:lstStyle/>
           <a:p>
             <a:r>
-              <a:rPr lang="en-US" sz="1800" dirty="0"/>
-              <a:t>% of Number of people through the years within different group ages.</a:t>
-            </a:r>
-          </a:p>
-          <a:p>
-            <a:r>
-              <a:rPr lang="en-US" sz="1800" dirty="0"/>
-              <a:t>We can see that in 2018, the amount of people within 36-46 years old increased by .36% for the Yellow Cab company.</a:t>
-            </a:r>
-          </a:p>
-        </p:txBody>
-      </p:sp>
-      <p:pic>
-        <p:nvPicPr>
-          <p:cNvPr id="7" name="Picture 6">
-            <a:extLst>
-              <a:ext uri="{FF2B5EF4-FFF2-40B4-BE49-F238E27FC236}">
-                <a16:creationId xmlns:a16="http://schemas.microsoft.com/office/drawing/2014/main" id="{6BDCD080-FADB-FA44-ADEC-D2A4E54082F9}"/>
-              </a:ext>
-            </a:extLst>
-          </p:cNvPr>
-          <p:cNvPicPr>
-            <a:picLocks noChangeAspect="1"/>
-          </p:cNvPicPr>
-          <p:nvPr/>
-        </p:nvPicPr>
-        <p:blipFill rotWithShape="1">
-          <a:blip r:embed="rId2"/>
-          <a:srcRect l="16203" r="7402" b="-3"/>
-          <a:stretch/>
-        </p:blipFill>
-        <p:spPr>
-          <a:xfrm>
-            <a:off x="4142232" y="2617201"/>
-            <a:ext cx="3913747" cy="3639312"/>
-          </a:xfrm>
-          <a:prstGeom prst="rect">
-            <a:avLst/>
-          </a:prstGeom>
-        </p:spPr>
-      </p:pic>
-      <p:pic>
-        <p:nvPicPr>
-          <p:cNvPr id="8" name="Picture 7">
-            <a:extLst>
-              <a:ext uri="{FF2B5EF4-FFF2-40B4-BE49-F238E27FC236}">
-                <a16:creationId xmlns:a16="http://schemas.microsoft.com/office/drawing/2014/main" id="{7786C706-644C-3144-A3D6-39DE4DEEA13F}"/>
-              </a:ext>
-            </a:extLst>
-          </p:cNvPr>
-          <p:cNvPicPr>
-            <a:picLocks noChangeAspect="1"/>
-          </p:cNvPicPr>
-          <p:nvPr/>
-        </p:nvPicPr>
-        <p:blipFill rotWithShape="1">
-          <a:blip r:embed="rId3"/>
-          <a:srcRect l="6477" t="3616" r="2" b="1642"/>
-          <a:stretch/>
-        </p:blipFill>
-        <p:spPr>
-          <a:xfrm>
-            <a:off x="8657863" y="2798177"/>
-            <a:ext cx="3352240" cy="3639312"/>
-          </a:xfrm>
-          <a:prstGeom prst="rect">
-            <a:avLst/>
-          </a:prstGeom>
-        </p:spPr>
-      </p:pic>
-      <p:pic>
-        <p:nvPicPr>
-          <p:cNvPr id="4" name="Picture 3">
-            <a:extLst>
-              <a:ext uri="{FF2B5EF4-FFF2-40B4-BE49-F238E27FC236}">
-                <a16:creationId xmlns:a16="http://schemas.microsoft.com/office/drawing/2014/main" id="{86DF4D9C-8D0F-EC4C-A45B-1CFC5CD035EE}"/>
-              </a:ext>
-            </a:extLst>
-          </p:cNvPr>
-          <p:cNvPicPr>
-            <a:picLocks noChangeAspect="1"/>
-          </p:cNvPicPr>
-          <p:nvPr/>
-        </p:nvPicPr>
-        <p:blipFill rotWithShape="1">
-          <a:blip r:embed="rId4"/>
-          <a:srcRect l="8117" r="3560" b="-2"/>
-          <a:stretch/>
-        </p:blipFill>
-        <p:spPr>
-          <a:xfrm>
-            <a:off x="181897" y="2708641"/>
-            <a:ext cx="3584448" cy="3639312"/>
-          </a:xfrm>
-          <a:prstGeom prst="rect">
-            <a:avLst/>
-          </a:prstGeom>
-        </p:spPr>
-      </p:pic>
+              <a:rPr lang="en-US" dirty="0"/>
+              <a:t>The age group for the whole data set are mostly people within 18-27 years old with a 32. 56%, followed by 27-36 years old with 28.04%.</a:t>
+            </a:r>
+          </a:p>
+        </p:txBody>
+      </p:sp>
     </p:spTree>
     <p:extLst>
       <p:ext uri="{BB962C8B-B14F-4D97-AF65-F5344CB8AC3E}">
-        <p14:creationId xmlns:p14="http://schemas.microsoft.com/office/powerpoint/2010/main" val="521395707"/>
+        <p14:creationId xmlns:p14="http://schemas.microsoft.com/office/powerpoint/2010/main" val="692558239"/>
       </p:ext>
     </p:extLst>
   </p:cSld>
@@ -5136,12 +4908,12 @@
           <a:chExt cx="0" cy="0"/>
         </a:xfrm>
       </p:grpSpPr>
-      <p:sp>
-        <p:nvSpPr>
-          <p:cNvPr id="31" name="Rectangle 30">
-            <a:extLst>
-              <a:ext uri="{FF2B5EF4-FFF2-40B4-BE49-F238E27FC236}">
-                <a16:creationId xmlns:a16="http://schemas.microsoft.com/office/drawing/2014/main" id="{08E89D5E-1885-4160-AC77-CC471DD1D0DB}"/>
+      <p:sp useBgFill="1">
+        <p:nvSpPr>
+          <p:cNvPr id="48" name="Rectangle 47">
+            <a:extLst>
+              <a:ext uri="{FF2B5EF4-FFF2-40B4-BE49-F238E27FC236}">
+                <a16:creationId xmlns:a16="http://schemas.microsoft.com/office/drawing/2014/main" id="{614141FC-8189-47F8-821A-FC9A4E91E039}"/>
               </a:ext>
               <a:ext uri="{C183D7F6-B498-43B3-948B-1728B52AA6E4}">
                 <adec:decorative xmlns:adec="http://schemas.microsoft.com/office/drawing/2017/decorative" val="1"/>
@@ -5162,7 +4934,7 @@
         <p:spPr>
           <a:xfrm>
             <a:off x="0" y="0"/>
-            <a:ext cx="4636008" cy="6858000"/>
+            <a:ext cx="12192000" cy="6858000"/>
           </a:xfrm>
           <a:prstGeom prst="rect">
             <a:avLst/>
@@ -5196,21 +4968,21 @@
           </a:p>
         </p:txBody>
       </p:sp>
-      <p:cxnSp>
-        <p:nvCxnSpPr>
-          <p:cNvPr id="33" name="Straight Connector 32">
-            <a:extLst>
-              <a:ext uri="{FF2B5EF4-FFF2-40B4-BE49-F238E27FC236}">
-                <a16:creationId xmlns:a16="http://schemas.microsoft.com/office/drawing/2014/main" id="{550D2BD1-98F9-412D-905B-3A843EF4078B}"/>
+      <p:sp useBgFill="1">
+        <p:nvSpPr>
+          <p:cNvPr id="50" name="Rectangle 49">
+            <a:extLst>
+              <a:ext uri="{FF2B5EF4-FFF2-40B4-BE49-F238E27FC236}">
+                <a16:creationId xmlns:a16="http://schemas.microsoft.com/office/drawing/2014/main" id="{C062E60F-5CD4-4268-8359-8076634680E5}"/>
               </a:ext>
               <a:ext uri="{C183D7F6-B498-43B3-948B-1728B52AA6E4}">
                 <adec:decorative xmlns:adec="http://schemas.microsoft.com/office/drawing/2017/decorative" val="1"/>
               </a:ext>
             </a:extLst>
           </p:cNvPr>
-          <p:cNvCxnSpPr>
-            <a:cxnSpLocks noGrp="1" noRot="1" noChangeAspect="1" noMove="1" noResize="1" noEditPoints="1" noAdjustHandles="1" noChangeArrowheads="1" noChangeShapeType="1"/>
-          </p:cNvCxnSpPr>
+          <p:cNvSpPr>
+            <a:spLocks noGrp="1" noRot="1" noChangeAspect="1" noMove="1" noResize="1" noEditPoints="1" noAdjustHandles="1" noChangeArrowheads="1" noChangeShapeType="1" noTextEdit="1"/>
+          </p:cNvSpPr>
           <p:nvPr>
             <p:extLst>
               <p:ext uri="{386F3935-93C4-4BCD-93E2-E3B085C9AB24}">
@@ -5218,44 +4990,338 @@
               </p:ext>
             </p:extLst>
           </p:nvPr>
-        </p:nvCxnSpPr>
-        <p:spPr>
-          <a:xfrm flipV="1">
-            <a:off x="585216" y="2971800"/>
-            <a:ext cx="0" cy="914400"/>
-          </a:xfrm>
-          <a:prstGeom prst="line">
+        </p:nvSpPr>
+        <p:spPr>
+          <a:xfrm>
+            <a:off x="554416" y="288350"/>
+            <a:ext cx="11167447" cy="2089317"/>
+          </a:xfrm>
+          <a:prstGeom prst="rect">
             <a:avLst/>
           </a:prstGeom>
-          <a:ln w="19050">
+          <a:ln w="12700">
             <a:solidFill>
-              <a:srgbClr val="FFFFFF">
-                <a:alpha val="80000"/>
-              </a:srgbClr>
+              <a:srgbClr val="DEDEDE"/>
             </a:solidFill>
           </a:ln>
+          <a:effectLst>
+            <a:outerShdw blurRad="50800" dist="38100" dir="2700000" algn="tl" rotWithShape="0">
+              <a:schemeClr val="bg2">
+                <a:lumMod val="85000"/>
+                <a:alpha val="50000"/>
+              </a:schemeClr>
+            </a:outerShdw>
+          </a:effectLst>
         </p:spPr>
         <p:style>
-          <a:lnRef idx="1">
-            <a:schemeClr val="accent1"/>
+          <a:lnRef idx="2">
+            <a:schemeClr val="accent1">
+              <a:shade val="50000"/>
+            </a:schemeClr>
           </a:lnRef>
-          <a:fillRef idx="0">
+          <a:fillRef idx="1">
             <a:schemeClr val="accent1"/>
           </a:fillRef>
           <a:effectRef idx="0">
             <a:schemeClr val="accent1"/>
           </a:effectRef>
           <a:fontRef idx="minor">
-            <a:schemeClr val="tx1"/>
+            <a:schemeClr val="lt1"/>
           </a:fontRef>
         </p:style>
-      </p:cxnSp>
+        <p:txBody>
+          <a:bodyPr rtlCol="0" anchor="ctr"/>
+          <a:lstStyle/>
+          <a:p>
+            <a:pPr marL="0" marR="0" lvl="0" indent="0" algn="ctr" defTabSz="914400" rtl="0" eaLnBrk="1" fontAlgn="auto" latinLnBrk="0" hangingPunct="1">
+              <a:lnSpc>
+                <a:spcPct val="100000"/>
+              </a:lnSpc>
+              <a:spcBef>
+                <a:spcPts val="0"/>
+              </a:spcBef>
+              <a:spcAft>
+                <a:spcPts val="0"/>
+              </a:spcAft>
+              <a:buClrTx/>
+              <a:buSzTx/>
+              <a:buFontTx/>
+              <a:buNone/>
+              <a:tabLst/>
+              <a:defRPr/>
+            </a:pPr>
+            <a:endParaRPr kumimoji="0" lang="en-US" sz="1800" b="0" i="0" u="none" strike="noStrike" kern="1200" cap="none" spc="0" normalizeH="0" baseline="0" noProof="0">
+              <a:ln>
+                <a:noFill/>
+              </a:ln>
+              <a:solidFill>
+                <a:prstClr val="white"/>
+              </a:solidFill>
+              <a:effectLst/>
+              <a:uLnTx/>
+              <a:uFillTx/>
+              <a:latin typeface="Calibri" panose="020F0502020204030204"/>
+              <a:ea typeface="+mn-ea"/>
+              <a:cs typeface="+mn-cs"/>
+            </a:endParaRPr>
+          </a:p>
+        </p:txBody>
+      </p:sp>
+      <p:sp>
+        <p:nvSpPr>
+          <p:cNvPr id="2" name="Title 1"/>
+          <p:cNvSpPr>
+            <a:spLocks noGrp="1"/>
+          </p:cNvSpPr>
+          <p:nvPr>
+            <p:ph type="title"/>
+          </p:nvPr>
+        </p:nvSpPr>
+        <p:spPr>
+          <a:xfrm>
+            <a:off x="841248" y="510047"/>
+            <a:ext cx="3300984" cy="1645920"/>
+          </a:xfrm>
+        </p:spPr>
+        <p:txBody>
+          <a:bodyPr>
+            <a:normAutofit/>
+          </a:bodyPr>
+          <a:lstStyle/>
+          <a:p>
+            <a:r>
+              <a:rPr lang="en-US" sz="2800" dirty="0"/>
+              <a:t>% of users through the years.</a:t>
+            </a:r>
+          </a:p>
+        </p:txBody>
+      </p:sp>
+      <p:sp>
+        <p:nvSpPr>
+          <p:cNvPr id="52" name="Rectangle 51">
+            <a:extLst>
+              <a:ext uri="{FF2B5EF4-FFF2-40B4-BE49-F238E27FC236}">
+                <a16:creationId xmlns:a16="http://schemas.microsoft.com/office/drawing/2014/main" id="{BB341EC3-1810-4D33-BA3F-E2D0AA0ECFB6}"/>
+              </a:ext>
+              <a:ext uri="{C183D7F6-B498-43B3-948B-1728B52AA6E4}">
+                <adec:decorative xmlns:adec="http://schemas.microsoft.com/office/drawing/2017/decorative" val="1"/>
+              </a:ext>
+            </a:extLst>
+          </p:cNvPr>
+          <p:cNvSpPr>
+            <a:spLocks noGrp="1" noRot="1" noChangeAspect="1" noMove="1" noResize="1" noEditPoints="1" noAdjustHandles="1" noChangeArrowheads="1" noChangeShapeType="1" noTextEdit="1"/>
+          </p:cNvSpPr>
+          <p:nvPr>
+            <p:extLst>
+              <p:ext uri="{386F3935-93C4-4BCD-93E2-E3B085C9AB24}">
+                <p16:designElem xmlns:p16="http://schemas.microsoft.com/office/powerpoint/2015/main" val="1"/>
+              </p:ext>
+            </p:extLst>
+          </p:nvPr>
+        </p:nvSpPr>
+        <p:spPr>
+          <a:xfrm>
+            <a:off x="490408" y="980964"/>
+            <a:ext cx="128016" cy="704088"/>
+          </a:xfrm>
+          <a:prstGeom prst="rect">
+            <a:avLst/>
+          </a:prstGeom>
+          <a:solidFill>
+            <a:schemeClr val="accent2"/>
+          </a:solidFill>
+          <a:ln>
+            <a:noFill/>
+          </a:ln>
+        </p:spPr>
+        <p:style>
+          <a:lnRef idx="2">
+            <a:schemeClr val="accent1">
+              <a:shade val="50000"/>
+            </a:schemeClr>
+          </a:lnRef>
+          <a:fillRef idx="1">
+            <a:schemeClr val="accent1"/>
+          </a:fillRef>
+          <a:effectRef idx="0">
+            <a:schemeClr val="accent1"/>
+          </a:effectRef>
+          <a:fontRef idx="minor">
+            <a:schemeClr val="lt1"/>
+          </a:fontRef>
+        </p:style>
+        <p:txBody>
+          <a:bodyPr rtlCol="0" anchor="ctr"/>
+          <a:lstStyle/>
+          <a:p>
+            <a:pPr marL="0" marR="0" lvl="0" indent="0" algn="ctr" defTabSz="914400" rtl="0" eaLnBrk="1" fontAlgn="auto" latinLnBrk="0" hangingPunct="1">
+              <a:lnSpc>
+                <a:spcPct val="100000"/>
+              </a:lnSpc>
+              <a:spcBef>
+                <a:spcPts val="0"/>
+              </a:spcBef>
+              <a:spcAft>
+                <a:spcPts val="0"/>
+              </a:spcAft>
+              <a:buClrTx/>
+              <a:buSzTx/>
+              <a:buFontTx/>
+              <a:buNone/>
+              <a:tabLst/>
+              <a:defRPr/>
+            </a:pPr>
+            <a:endParaRPr kumimoji="0" lang="en-US" sz="1800" b="0" i="0" u="none" strike="noStrike" kern="1200" cap="none" spc="0" normalizeH="0" baseline="0" noProof="0" dirty="0">
+              <a:ln>
+                <a:noFill/>
+              </a:ln>
+              <a:solidFill>
+                <a:prstClr val="white"/>
+              </a:solidFill>
+              <a:effectLst/>
+              <a:uLnTx/>
+              <a:uFillTx/>
+              <a:latin typeface="Calibri" panose="020F0502020204030204"/>
+              <a:ea typeface="+mn-ea"/>
+              <a:cs typeface="+mn-cs"/>
+            </a:endParaRPr>
+          </a:p>
+        </p:txBody>
+      </p:sp>
+      <p:sp>
+        <p:nvSpPr>
+          <p:cNvPr id="54" name="Rectangle 53">
+            <a:extLst>
+              <a:ext uri="{FF2B5EF4-FFF2-40B4-BE49-F238E27FC236}">
+                <a16:creationId xmlns:a16="http://schemas.microsoft.com/office/drawing/2014/main" id="{10127CDE-2B99-47A8-BB3C-7D17519105E0}"/>
+              </a:ext>
+              <a:ext uri="{C183D7F6-B498-43B3-948B-1728B52AA6E4}">
+                <adec:decorative xmlns:adec="http://schemas.microsoft.com/office/drawing/2017/decorative" val="1"/>
+              </a:ext>
+            </a:extLst>
+          </p:cNvPr>
+          <p:cNvSpPr>
+            <a:spLocks noGrp="1" noRot="1" noChangeAspect="1" noMove="1" noResize="1" noEditPoints="1" noAdjustHandles="1" noChangeArrowheads="1" noChangeShapeType="1" noTextEdit="1"/>
+          </p:cNvSpPr>
+          <p:nvPr>
+            <p:extLst>
+              <p:ext uri="{386F3935-93C4-4BCD-93E2-E3B085C9AB24}">
+                <p16:designElem xmlns:p16="http://schemas.microsoft.com/office/powerpoint/2015/main" val="1"/>
+              </p:ext>
+            </p:extLst>
+          </p:nvPr>
+        </p:nvSpPr>
+        <p:spPr>
+          <a:xfrm rot="5400000">
+            <a:off x="3598164" y="1323863"/>
+            <a:ext cx="1463040" cy="18288"/>
+          </a:xfrm>
+          <a:prstGeom prst="rect">
+            <a:avLst/>
+          </a:prstGeom>
+          <a:solidFill>
+            <a:srgbClr val="D5D5D5"/>
+          </a:solidFill>
+          <a:ln w="3175">
+            <a:noFill/>
+          </a:ln>
+          <a:effectLst/>
+        </p:spPr>
+        <p:style>
+          <a:lnRef idx="2">
+            <a:schemeClr val="accent1">
+              <a:shade val="50000"/>
+            </a:schemeClr>
+          </a:lnRef>
+          <a:fillRef idx="1">
+            <a:schemeClr val="accent1"/>
+          </a:fillRef>
+          <a:effectRef idx="0">
+            <a:schemeClr val="accent1"/>
+          </a:effectRef>
+          <a:fontRef idx="minor">
+            <a:schemeClr val="lt1"/>
+          </a:fontRef>
+        </p:style>
+        <p:txBody>
+          <a:bodyPr rtlCol="0" anchor="ctr"/>
+          <a:lstStyle/>
+          <a:p>
+            <a:pPr marL="0" marR="0" lvl="0" indent="0" algn="ctr" defTabSz="914400" rtl="0" eaLnBrk="1" fontAlgn="auto" latinLnBrk="0" hangingPunct="1">
+              <a:lnSpc>
+                <a:spcPct val="100000"/>
+              </a:lnSpc>
+              <a:spcBef>
+                <a:spcPts val="0"/>
+              </a:spcBef>
+              <a:spcAft>
+                <a:spcPts val="0"/>
+              </a:spcAft>
+              <a:buClrTx/>
+              <a:buSzTx/>
+              <a:buFontTx/>
+              <a:buNone/>
+              <a:tabLst/>
+              <a:defRPr/>
+            </a:pPr>
+            <a:endParaRPr kumimoji="0" lang="en-US" sz="1800" b="0" i="0" u="none" strike="noStrike" kern="1200" cap="none" spc="0" normalizeH="0" baseline="0" noProof="0">
+              <a:ln>
+                <a:noFill/>
+              </a:ln>
+              <a:solidFill>
+                <a:prstClr val="white"/>
+              </a:solidFill>
+              <a:effectLst/>
+              <a:uLnTx/>
+              <a:uFillTx/>
+              <a:latin typeface="Calibri" panose="020F0502020204030204"/>
+              <a:ea typeface="+mn-ea"/>
+              <a:cs typeface="+mn-cs"/>
+            </a:endParaRPr>
+          </a:p>
+        </p:txBody>
+      </p:sp>
+      <p:sp>
+        <p:nvSpPr>
+          <p:cNvPr id="3" name="Content Placeholder 2"/>
+          <p:cNvSpPr>
+            <a:spLocks noGrp="1"/>
+          </p:cNvSpPr>
+          <p:nvPr>
+            <p:ph idx="1"/>
+          </p:nvPr>
+        </p:nvSpPr>
+        <p:spPr>
+          <a:xfrm>
+            <a:off x="4581144" y="510047"/>
+            <a:ext cx="6858000" cy="1645920"/>
+          </a:xfrm>
+        </p:spPr>
+        <p:txBody>
+          <a:bodyPr anchor="ctr">
+            <a:normAutofit/>
+          </a:bodyPr>
+          <a:lstStyle/>
+          <a:p>
+            <a:r>
+              <a:rPr lang="en-US" sz="1800" dirty="0"/>
+              <a:t>% of Number of people through the years within different group ages.</a:t>
+            </a:r>
+          </a:p>
+          <a:p>
+            <a:r>
+              <a:rPr lang="en-US" sz="1800" dirty="0"/>
+              <a:t>We can see that in 2018, the amount of people within 36-46 years old increased by .36% for the Yellow Cab company.</a:t>
+            </a:r>
+          </a:p>
+        </p:txBody>
+      </p:sp>
       <p:pic>
         <p:nvPicPr>
-          <p:cNvPr id="4" name="Picture 3">
-            <a:extLst>
-              <a:ext uri="{FF2B5EF4-FFF2-40B4-BE49-F238E27FC236}">
-                <a16:creationId xmlns:a16="http://schemas.microsoft.com/office/drawing/2014/main" id="{10D6FC52-AE0E-8546-AC45-72F688111249}"/>
+          <p:cNvPr id="7" name="Picture 6">
+            <a:extLst>
+              <a:ext uri="{FF2B5EF4-FFF2-40B4-BE49-F238E27FC236}">
+                <a16:creationId xmlns:a16="http://schemas.microsoft.com/office/drawing/2014/main" id="{6BDCD080-FADB-FA44-ADEC-D2A4E54082F9}"/>
               </a:ext>
             </a:extLst>
           </p:cNvPr>
@@ -5266,13 +5332,13 @@
         </p:nvPicPr>
         <p:blipFill rotWithShape="1">
           <a:blip r:embed="rId2"/>
-          <a:srcRect t="42902"/>
+          <a:srcRect l="16203" r="7402" b="-3"/>
           <a:stretch/>
         </p:blipFill>
         <p:spPr>
           <a:xfrm>
-            <a:off x="4691877" y="238125"/>
-            <a:ext cx="4636008" cy="5467350"/>
+            <a:off x="4142232" y="2617201"/>
+            <a:ext cx="3913747" cy="3639312"/>
           </a:xfrm>
           <a:prstGeom prst="rect">
             <a:avLst/>
@@ -5281,10 +5347,10 @@
       </p:pic>
       <p:pic>
         <p:nvPicPr>
-          <p:cNvPr id="14" name="Picture 13">
-            <a:extLst>
-              <a:ext uri="{FF2B5EF4-FFF2-40B4-BE49-F238E27FC236}">
-                <a16:creationId xmlns:a16="http://schemas.microsoft.com/office/drawing/2014/main" id="{CDCFB434-5D5A-6342-B091-96B84ABC29C9}"/>
+          <p:cNvPr id="8" name="Picture 7">
+            <a:extLst>
+              <a:ext uri="{FF2B5EF4-FFF2-40B4-BE49-F238E27FC236}">
+                <a16:creationId xmlns:a16="http://schemas.microsoft.com/office/drawing/2014/main" id="{7786C706-644C-3144-A3D6-39DE4DEEA13F}"/>
               </a:ext>
             </a:extLst>
           </p:cNvPr>
@@ -5294,62 +5360,26 @@
           <p:nvPr/>
         </p:nvPicPr>
         <p:blipFill rotWithShape="1">
-          <a:blip r:embed="rId2"/>
-          <a:srcRect r="20497" b="57098"/>
+          <a:blip r:embed="rId3"/>
+          <a:srcRect l="6477" t="3616" r="2" b="1642"/>
           <a:stretch/>
         </p:blipFill>
         <p:spPr>
           <a:xfrm>
-            <a:off x="8504809" y="1207083"/>
-            <a:ext cx="3101975" cy="3529434"/>
+            <a:off x="8657863" y="2798177"/>
+            <a:ext cx="3352240" cy="3639312"/>
           </a:xfrm>
           <a:prstGeom prst="rect">
             <a:avLst/>
           </a:prstGeom>
         </p:spPr>
       </p:pic>
-      <p:sp>
-        <p:nvSpPr>
-          <p:cNvPr id="2" name="Title 1"/>
-          <p:cNvSpPr>
-            <a:spLocks noGrp="1"/>
-          </p:cNvSpPr>
-          <p:nvPr>
-            <p:ph type="title"/>
-          </p:nvPr>
-        </p:nvSpPr>
-        <p:spPr>
-          <a:xfrm>
-            <a:off x="943277" y="712269"/>
-            <a:ext cx="3370998" cy="5502264"/>
-          </a:xfrm>
-        </p:spPr>
-        <p:txBody>
-          <a:bodyPr vert="horz" lIns="91440" tIns="45720" rIns="91440" bIns="45720" rtlCol="0">
-            <a:normAutofit/>
-          </a:bodyPr>
-          <a:lstStyle/>
-          <a:p>
-            <a:r>
-              <a:rPr lang="en-US" kern="1200" dirty="0">
-                <a:solidFill>
-                  <a:srgbClr val="FFFFFF"/>
-                </a:solidFill>
-                <a:latin typeface="+mj-lt"/>
-                <a:ea typeface="+mj-ea"/>
-                <a:cs typeface="+mj-cs"/>
-              </a:rPr>
-              <a:t>Amount of people per city divided by gender</a:t>
-            </a:r>
-          </a:p>
-        </p:txBody>
-      </p:sp>
       <p:pic>
         <p:nvPicPr>
-          <p:cNvPr id="6" name="Picture 5">
-            <a:extLst>
-              <a:ext uri="{FF2B5EF4-FFF2-40B4-BE49-F238E27FC236}">
-                <a16:creationId xmlns:a16="http://schemas.microsoft.com/office/drawing/2014/main" id="{B806F4D8-81D8-ED47-AFA8-0B5A92B5741E}"/>
+          <p:cNvPr id="4" name="Picture 3">
+            <a:extLst>
+              <a:ext uri="{FF2B5EF4-FFF2-40B4-BE49-F238E27FC236}">
+                <a16:creationId xmlns:a16="http://schemas.microsoft.com/office/drawing/2014/main" id="{86DF4D9C-8D0F-EC4C-A45B-1CFC5CD035EE}"/>
               </a:ext>
             </a:extLst>
           </p:cNvPr>
@@ -5358,61 +5388,25 @@
           </p:cNvPicPr>
           <p:nvPr/>
         </p:nvPicPr>
-        <p:blipFill>
-          <a:blip r:embed="rId3"/>
-          <a:stretch>
-            <a:fillRect/>
-          </a:stretch>
+        <p:blipFill rotWithShape="1">
+          <a:blip r:embed="rId4"/>
+          <a:srcRect l="8117" r="3560" b="-2"/>
+          <a:stretch/>
         </p:blipFill>
         <p:spPr>
           <a:xfrm>
-            <a:off x="8990072" y="4586307"/>
-            <a:ext cx="2526737" cy="1064609"/>
+            <a:off x="181897" y="2708641"/>
+            <a:ext cx="3584448" cy="3639312"/>
           </a:xfrm>
           <a:prstGeom prst="rect">
             <a:avLst/>
           </a:prstGeom>
         </p:spPr>
       </p:pic>
-      <p:sp>
-        <p:nvSpPr>
-          <p:cNvPr id="7" name="TextBox 6">
-            <a:extLst>
-              <a:ext uri="{FF2B5EF4-FFF2-40B4-BE49-F238E27FC236}">
-                <a16:creationId xmlns:a16="http://schemas.microsoft.com/office/drawing/2014/main" id="{D8F3456F-0C09-5542-A958-BD81D3295944}"/>
-              </a:ext>
-            </a:extLst>
-          </p:cNvPr>
-          <p:cNvSpPr txBox="1"/>
-          <p:nvPr/>
-        </p:nvSpPr>
-        <p:spPr>
-          <a:xfrm>
-            <a:off x="5220183" y="6065134"/>
-            <a:ext cx="6386602" cy="646331"/>
-          </a:xfrm>
-          <a:prstGeom prst="rect">
-            <a:avLst/>
-          </a:prstGeom>
-          <a:noFill/>
-        </p:spPr>
-        <p:txBody>
-          <a:bodyPr wrap="square" rtlCol="0">
-            <a:spAutoFit/>
-          </a:bodyPr>
-          <a:lstStyle/>
-          <a:p>
-            <a:r>
-              <a:rPr lang="en-US" dirty="0"/>
-              <a:t>In the following graphs we can see the amount of people each city has divided by  gender.</a:t>
-            </a:r>
-          </a:p>
-        </p:txBody>
-      </p:sp>
     </p:spTree>
     <p:extLst>
       <p:ext uri="{BB962C8B-B14F-4D97-AF65-F5344CB8AC3E}">
-        <p14:creationId xmlns:p14="http://schemas.microsoft.com/office/powerpoint/2010/main" val="2086544236"/>
+        <p14:creationId xmlns:p14="http://schemas.microsoft.com/office/powerpoint/2010/main" val="521395707"/>
       </p:ext>
     </p:extLst>
   </p:cSld>
@@ -5449,6 +5443,317 @@
       </p:grpSpPr>
       <p:sp>
         <p:nvSpPr>
+          <p:cNvPr id="31" name="Rectangle 30">
+            <a:extLst>
+              <a:ext uri="{FF2B5EF4-FFF2-40B4-BE49-F238E27FC236}">
+                <a16:creationId xmlns:a16="http://schemas.microsoft.com/office/drawing/2014/main" id="{08E89D5E-1885-4160-AC77-CC471DD1D0DB}"/>
+              </a:ext>
+              <a:ext uri="{C183D7F6-B498-43B3-948B-1728B52AA6E4}">
+                <adec:decorative xmlns:adec="http://schemas.microsoft.com/office/drawing/2017/decorative" val="1"/>
+              </a:ext>
+            </a:extLst>
+          </p:cNvPr>
+          <p:cNvSpPr>
+            <a:spLocks noGrp="1" noRot="1" noChangeAspect="1" noMove="1" noResize="1" noEditPoints="1" noAdjustHandles="1" noChangeArrowheads="1" noChangeShapeType="1" noTextEdit="1"/>
+          </p:cNvSpPr>
+          <p:nvPr>
+            <p:extLst>
+              <p:ext uri="{386F3935-93C4-4BCD-93E2-E3B085C9AB24}">
+                <p16:designElem xmlns:p16="http://schemas.microsoft.com/office/powerpoint/2015/main" val="1"/>
+              </p:ext>
+            </p:extLst>
+          </p:nvPr>
+        </p:nvSpPr>
+        <p:spPr>
+          <a:xfrm>
+            <a:off x="0" y="0"/>
+            <a:ext cx="4636008" cy="6858000"/>
+          </a:xfrm>
+          <a:prstGeom prst="rect">
+            <a:avLst/>
+          </a:prstGeom>
+          <a:ln>
+            <a:noFill/>
+          </a:ln>
+        </p:spPr>
+        <p:style>
+          <a:lnRef idx="2">
+            <a:schemeClr val="accent1">
+              <a:shade val="50000"/>
+            </a:schemeClr>
+          </a:lnRef>
+          <a:fillRef idx="1">
+            <a:schemeClr val="accent1"/>
+          </a:fillRef>
+          <a:effectRef idx="0">
+            <a:schemeClr val="accent1"/>
+          </a:effectRef>
+          <a:fontRef idx="minor">
+            <a:schemeClr val="lt1"/>
+          </a:fontRef>
+        </p:style>
+        <p:txBody>
+          <a:bodyPr rtlCol="0" anchor="ctr"/>
+          <a:lstStyle/>
+          <a:p>
+            <a:pPr algn="ctr"/>
+            <a:endParaRPr lang="en-US"/>
+          </a:p>
+        </p:txBody>
+      </p:sp>
+      <p:cxnSp>
+        <p:nvCxnSpPr>
+          <p:cNvPr id="33" name="Straight Connector 32">
+            <a:extLst>
+              <a:ext uri="{FF2B5EF4-FFF2-40B4-BE49-F238E27FC236}">
+                <a16:creationId xmlns:a16="http://schemas.microsoft.com/office/drawing/2014/main" id="{550D2BD1-98F9-412D-905B-3A843EF4078B}"/>
+              </a:ext>
+              <a:ext uri="{C183D7F6-B498-43B3-948B-1728B52AA6E4}">
+                <adec:decorative xmlns:adec="http://schemas.microsoft.com/office/drawing/2017/decorative" val="1"/>
+              </a:ext>
+            </a:extLst>
+          </p:cNvPr>
+          <p:cNvCxnSpPr>
+            <a:cxnSpLocks noGrp="1" noRot="1" noChangeAspect="1" noMove="1" noResize="1" noEditPoints="1" noAdjustHandles="1" noChangeArrowheads="1" noChangeShapeType="1"/>
+          </p:cNvCxnSpPr>
+          <p:nvPr>
+            <p:extLst>
+              <p:ext uri="{386F3935-93C4-4BCD-93E2-E3B085C9AB24}">
+                <p16:designElem xmlns:p16="http://schemas.microsoft.com/office/powerpoint/2015/main" val="1"/>
+              </p:ext>
+            </p:extLst>
+          </p:nvPr>
+        </p:nvCxnSpPr>
+        <p:spPr>
+          <a:xfrm flipV="1">
+            <a:off x="585216" y="2971800"/>
+            <a:ext cx="0" cy="914400"/>
+          </a:xfrm>
+          <a:prstGeom prst="line">
+            <a:avLst/>
+          </a:prstGeom>
+          <a:ln w="19050">
+            <a:solidFill>
+              <a:srgbClr val="FFFFFF">
+                <a:alpha val="80000"/>
+              </a:srgbClr>
+            </a:solidFill>
+          </a:ln>
+        </p:spPr>
+        <p:style>
+          <a:lnRef idx="1">
+            <a:schemeClr val="accent1"/>
+          </a:lnRef>
+          <a:fillRef idx="0">
+            <a:schemeClr val="accent1"/>
+          </a:fillRef>
+          <a:effectRef idx="0">
+            <a:schemeClr val="accent1"/>
+          </a:effectRef>
+          <a:fontRef idx="minor">
+            <a:schemeClr val="tx1"/>
+          </a:fontRef>
+        </p:style>
+      </p:cxnSp>
+      <p:pic>
+        <p:nvPicPr>
+          <p:cNvPr id="4" name="Picture 3">
+            <a:extLst>
+              <a:ext uri="{FF2B5EF4-FFF2-40B4-BE49-F238E27FC236}">
+                <a16:creationId xmlns:a16="http://schemas.microsoft.com/office/drawing/2014/main" id="{10D6FC52-AE0E-8546-AC45-72F688111249}"/>
+              </a:ext>
+            </a:extLst>
+          </p:cNvPr>
+          <p:cNvPicPr>
+            <a:picLocks noChangeAspect="1"/>
+          </p:cNvPicPr>
+          <p:nvPr/>
+        </p:nvPicPr>
+        <p:blipFill rotWithShape="1">
+          <a:blip r:embed="rId2"/>
+          <a:srcRect t="42902"/>
+          <a:stretch/>
+        </p:blipFill>
+        <p:spPr>
+          <a:xfrm>
+            <a:off x="4691877" y="238125"/>
+            <a:ext cx="4636008" cy="5467350"/>
+          </a:xfrm>
+          <a:prstGeom prst="rect">
+            <a:avLst/>
+          </a:prstGeom>
+        </p:spPr>
+      </p:pic>
+      <p:pic>
+        <p:nvPicPr>
+          <p:cNvPr id="14" name="Picture 13">
+            <a:extLst>
+              <a:ext uri="{FF2B5EF4-FFF2-40B4-BE49-F238E27FC236}">
+                <a16:creationId xmlns:a16="http://schemas.microsoft.com/office/drawing/2014/main" id="{CDCFB434-5D5A-6342-B091-96B84ABC29C9}"/>
+              </a:ext>
+            </a:extLst>
+          </p:cNvPr>
+          <p:cNvPicPr>
+            <a:picLocks noChangeAspect="1"/>
+          </p:cNvPicPr>
+          <p:nvPr/>
+        </p:nvPicPr>
+        <p:blipFill rotWithShape="1">
+          <a:blip r:embed="rId2"/>
+          <a:srcRect r="20497" b="57098"/>
+          <a:stretch/>
+        </p:blipFill>
+        <p:spPr>
+          <a:xfrm>
+            <a:off x="8504809" y="1207083"/>
+            <a:ext cx="3101975" cy="3529434"/>
+          </a:xfrm>
+          <a:prstGeom prst="rect">
+            <a:avLst/>
+          </a:prstGeom>
+        </p:spPr>
+      </p:pic>
+      <p:sp>
+        <p:nvSpPr>
+          <p:cNvPr id="2" name="Title 1"/>
+          <p:cNvSpPr>
+            <a:spLocks noGrp="1"/>
+          </p:cNvSpPr>
+          <p:nvPr>
+            <p:ph type="title"/>
+          </p:nvPr>
+        </p:nvSpPr>
+        <p:spPr>
+          <a:xfrm>
+            <a:off x="943277" y="712269"/>
+            <a:ext cx="3370998" cy="5502264"/>
+          </a:xfrm>
+        </p:spPr>
+        <p:txBody>
+          <a:bodyPr vert="horz" lIns="91440" tIns="45720" rIns="91440" bIns="45720" rtlCol="0">
+            <a:normAutofit/>
+          </a:bodyPr>
+          <a:lstStyle/>
+          <a:p>
+            <a:r>
+              <a:rPr lang="en-US" kern="1200" dirty="0">
+                <a:solidFill>
+                  <a:srgbClr val="FFFFFF"/>
+                </a:solidFill>
+                <a:latin typeface="+mj-lt"/>
+                <a:ea typeface="+mj-ea"/>
+                <a:cs typeface="+mj-cs"/>
+              </a:rPr>
+              <a:t>Amount of people per city divided by gender</a:t>
+            </a:r>
+          </a:p>
+        </p:txBody>
+      </p:sp>
+      <p:pic>
+        <p:nvPicPr>
+          <p:cNvPr id="6" name="Picture 5">
+            <a:extLst>
+              <a:ext uri="{FF2B5EF4-FFF2-40B4-BE49-F238E27FC236}">
+                <a16:creationId xmlns:a16="http://schemas.microsoft.com/office/drawing/2014/main" id="{B806F4D8-81D8-ED47-AFA8-0B5A92B5741E}"/>
+              </a:ext>
+            </a:extLst>
+          </p:cNvPr>
+          <p:cNvPicPr>
+            <a:picLocks noChangeAspect="1"/>
+          </p:cNvPicPr>
+          <p:nvPr/>
+        </p:nvPicPr>
+        <p:blipFill>
+          <a:blip r:embed="rId3"/>
+          <a:stretch>
+            <a:fillRect/>
+          </a:stretch>
+        </p:blipFill>
+        <p:spPr>
+          <a:xfrm>
+            <a:off x="8990072" y="4586307"/>
+            <a:ext cx="2526737" cy="1064609"/>
+          </a:xfrm>
+          <a:prstGeom prst="rect">
+            <a:avLst/>
+          </a:prstGeom>
+        </p:spPr>
+      </p:pic>
+      <p:sp>
+        <p:nvSpPr>
+          <p:cNvPr id="7" name="TextBox 6">
+            <a:extLst>
+              <a:ext uri="{FF2B5EF4-FFF2-40B4-BE49-F238E27FC236}">
+                <a16:creationId xmlns:a16="http://schemas.microsoft.com/office/drawing/2014/main" id="{D8F3456F-0C09-5542-A958-BD81D3295944}"/>
+              </a:ext>
+            </a:extLst>
+          </p:cNvPr>
+          <p:cNvSpPr txBox="1"/>
+          <p:nvPr/>
+        </p:nvSpPr>
+        <p:spPr>
+          <a:xfrm>
+            <a:off x="5220183" y="6065134"/>
+            <a:ext cx="6386602" cy="646331"/>
+          </a:xfrm>
+          <a:prstGeom prst="rect">
+            <a:avLst/>
+          </a:prstGeom>
+          <a:noFill/>
+        </p:spPr>
+        <p:txBody>
+          <a:bodyPr wrap="square" rtlCol="0">
+            <a:spAutoFit/>
+          </a:bodyPr>
+          <a:lstStyle/>
+          <a:p>
+            <a:r>
+              <a:rPr lang="en-US" dirty="0"/>
+              <a:t>In the following graphs we can see the amount of people each city has divided by  gender.</a:t>
+            </a:r>
+          </a:p>
+        </p:txBody>
+      </p:sp>
+    </p:spTree>
+    <p:extLst>
+      <p:ext uri="{BB962C8B-B14F-4D97-AF65-F5344CB8AC3E}">
+        <p14:creationId xmlns:p14="http://schemas.microsoft.com/office/powerpoint/2010/main" val="2086544236"/>
+      </p:ext>
+    </p:extLst>
+  </p:cSld>
+  <p:clrMapOvr>
+    <a:masterClrMapping/>
+  </p:clrMapOvr>
+</p:sld>
+</file>
+
+<file path=ppt/slides/slide14.xml><?xml version="1.0" encoding="utf-8"?>
+<p:sld xmlns:a="http://schemas.openxmlformats.org/drawingml/2006/main" xmlns:r="http://schemas.openxmlformats.org/officeDocument/2006/relationships" xmlns:p="http://schemas.openxmlformats.org/presentationml/2006/main">
+  <p:cSld>
+    <p:bg>
+      <p:bgPr>
+        <a:solidFill>
+          <a:schemeClr val="bg1"/>
+        </a:solidFill>
+        <a:effectLst/>
+      </p:bgPr>
+    </p:bg>
+    <p:spTree>
+      <p:nvGrpSpPr>
+        <p:cNvPr id="1" name=""/>
+        <p:cNvGrpSpPr/>
+        <p:nvPr/>
+      </p:nvGrpSpPr>
+      <p:grpSpPr>
+        <a:xfrm>
+          <a:off x="0" y="0"/>
+          <a:ext cx="0" cy="0"/>
+          <a:chOff x="0" y="0"/>
+          <a:chExt cx="0" cy="0"/>
+        </a:xfrm>
+      </p:grpSpPr>
+      <p:sp>
+        <p:nvSpPr>
           <p:cNvPr id="11" name="Down Arrow 7">
             <a:extLst>
               <a:ext uri="{FF2B5EF4-FFF2-40B4-BE49-F238E27FC236}">
@@ -5659,92 +5964,6 @@
 </p:sld>
 </file>
 
-<file path=ppt/slides/slide14.xml><?xml version="1.0" encoding="utf-8"?>
-<p:sld xmlns:a="http://schemas.openxmlformats.org/drawingml/2006/main" xmlns:r="http://schemas.openxmlformats.org/officeDocument/2006/relationships" xmlns:p="http://schemas.openxmlformats.org/presentationml/2006/main">
-  <p:cSld>
-    <p:spTree>
-      <p:nvGrpSpPr>
-        <p:cNvPr id="1" name=""/>
-        <p:cNvGrpSpPr/>
-        <p:nvPr/>
-      </p:nvGrpSpPr>
-      <p:grpSpPr>
-        <a:xfrm>
-          <a:off x="0" y="0"/>
-          <a:ext cx="0" cy="0"/>
-          <a:chOff x="0" y="0"/>
-          <a:chExt cx="0" cy="0"/>
-        </a:xfrm>
-      </p:grpSpPr>
-      <p:sp>
-        <p:nvSpPr>
-          <p:cNvPr id="2" name="Title 1">
-            <a:extLst>
-              <a:ext uri="{FF2B5EF4-FFF2-40B4-BE49-F238E27FC236}">
-                <a16:creationId xmlns:a16="http://schemas.microsoft.com/office/drawing/2014/main" id="{3EC44E90-59D8-B443-9597-4574DECEBA7E}"/>
-              </a:ext>
-            </a:extLst>
-          </p:cNvPr>
-          <p:cNvSpPr>
-            <a:spLocks noGrp="1"/>
-          </p:cNvSpPr>
-          <p:nvPr>
-            <p:ph type="title"/>
-          </p:nvPr>
-        </p:nvSpPr>
-        <p:spPr/>
-        <p:txBody>
-          <a:bodyPr/>
-          <a:lstStyle/>
-          <a:p>
-            <a:r>
-              <a:rPr lang="en-US" dirty="0"/>
-              <a:t>Conclusions</a:t>
-            </a:r>
-          </a:p>
-        </p:txBody>
-      </p:sp>
-      <p:sp>
-        <p:nvSpPr>
-          <p:cNvPr id="3" name="Content Placeholder 2">
-            <a:extLst>
-              <a:ext uri="{FF2B5EF4-FFF2-40B4-BE49-F238E27FC236}">
-                <a16:creationId xmlns:a16="http://schemas.microsoft.com/office/drawing/2014/main" id="{DDCF47A2-E472-CE42-BF96-E6E60669A330}"/>
-              </a:ext>
-            </a:extLst>
-          </p:cNvPr>
-          <p:cNvSpPr>
-            <a:spLocks noGrp="1"/>
-          </p:cNvSpPr>
-          <p:nvPr>
-            <p:ph idx="1"/>
-          </p:nvPr>
-        </p:nvSpPr>
-        <p:spPr/>
-        <p:txBody>
-          <a:bodyPr/>
-          <a:lstStyle/>
-          <a:p>
-            <a:r>
-              <a:rPr lang="en-US" dirty="0"/>
-              <a:t>Following the previous analysis about both cab companies we can see clearly that the Yellow Cab company is a much better investment, since it has better profits, gross profits, not only per year but in most cities, the Yellow Cab Company also has the most users in every city, which makes him a better candidate to grow.</a:t>
-            </a:r>
-          </a:p>
-        </p:txBody>
-      </p:sp>
-    </p:spTree>
-    <p:extLst>
-      <p:ext uri="{BB962C8B-B14F-4D97-AF65-F5344CB8AC3E}">
-        <p14:creationId xmlns:p14="http://schemas.microsoft.com/office/powerpoint/2010/main" val="1979702934"/>
-      </p:ext>
-    </p:extLst>
-  </p:cSld>
-  <p:clrMapOvr>
-    <a:masterClrMapping/>
-  </p:clrMapOvr>
-</p:sld>
-</file>
-
 <file path=ppt/slides/slide15.xml><?xml version="1.0" encoding="utf-8"?>
 <p:sld xmlns:a="http://schemas.openxmlformats.org/drawingml/2006/main" xmlns:r="http://schemas.openxmlformats.org/officeDocument/2006/relationships" xmlns:p="http://schemas.openxmlformats.org/presentationml/2006/main">
   <p:cSld>
@@ -5767,6 +5986,92 @@
           <p:cNvPr id="2" name="Title 1">
             <a:extLst>
               <a:ext uri="{FF2B5EF4-FFF2-40B4-BE49-F238E27FC236}">
+                <a16:creationId xmlns:a16="http://schemas.microsoft.com/office/drawing/2014/main" id="{3EC44E90-59D8-B443-9597-4574DECEBA7E}"/>
+              </a:ext>
+            </a:extLst>
+          </p:cNvPr>
+          <p:cNvSpPr>
+            <a:spLocks noGrp="1"/>
+          </p:cNvSpPr>
+          <p:nvPr>
+            <p:ph type="title"/>
+          </p:nvPr>
+        </p:nvSpPr>
+        <p:spPr/>
+        <p:txBody>
+          <a:bodyPr/>
+          <a:lstStyle/>
+          <a:p>
+            <a:r>
+              <a:rPr lang="en-US" dirty="0"/>
+              <a:t>Conclusions</a:t>
+            </a:r>
+          </a:p>
+        </p:txBody>
+      </p:sp>
+      <p:sp>
+        <p:nvSpPr>
+          <p:cNvPr id="3" name="Content Placeholder 2">
+            <a:extLst>
+              <a:ext uri="{FF2B5EF4-FFF2-40B4-BE49-F238E27FC236}">
+                <a16:creationId xmlns:a16="http://schemas.microsoft.com/office/drawing/2014/main" id="{DDCF47A2-E472-CE42-BF96-E6E60669A330}"/>
+              </a:ext>
+            </a:extLst>
+          </p:cNvPr>
+          <p:cNvSpPr>
+            <a:spLocks noGrp="1"/>
+          </p:cNvSpPr>
+          <p:nvPr>
+            <p:ph idx="1"/>
+          </p:nvPr>
+        </p:nvSpPr>
+        <p:spPr/>
+        <p:txBody>
+          <a:bodyPr/>
+          <a:lstStyle/>
+          <a:p>
+            <a:r>
+              <a:rPr lang="en-US" dirty="0"/>
+              <a:t>Following the previous analysis about both cab companies we can see clearly that the Yellow Cab company is a much better investment, since it has better profits, gross profits, not only per year but in most cities, the Yellow Cab Company also has the most users in every city, which makes him a better candidate to grow.</a:t>
+            </a:r>
+          </a:p>
+        </p:txBody>
+      </p:sp>
+    </p:spTree>
+    <p:extLst>
+      <p:ext uri="{BB962C8B-B14F-4D97-AF65-F5344CB8AC3E}">
+        <p14:creationId xmlns:p14="http://schemas.microsoft.com/office/powerpoint/2010/main" val="1979702934"/>
+      </p:ext>
+    </p:extLst>
+  </p:cSld>
+  <p:clrMapOvr>
+    <a:masterClrMapping/>
+  </p:clrMapOvr>
+</p:sld>
+</file>
+
+<file path=ppt/slides/slide16.xml><?xml version="1.0" encoding="utf-8"?>
+<p:sld xmlns:a="http://schemas.openxmlformats.org/drawingml/2006/main" xmlns:r="http://schemas.openxmlformats.org/officeDocument/2006/relationships" xmlns:p="http://schemas.openxmlformats.org/presentationml/2006/main">
+  <p:cSld>
+    <p:spTree>
+      <p:nvGrpSpPr>
+        <p:cNvPr id="1" name=""/>
+        <p:cNvGrpSpPr/>
+        <p:nvPr/>
+      </p:nvGrpSpPr>
+      <p:grpSpPr>
+        <a:xfrm>
+          <a:off x="0" y="0"/>
+          <a:ext cx="0" cy="0"/>
+          <a:chOff x="0" y="0"/>
+          <a:chExt cx="0" cy="0"/>
+        </a:xfrm>
+      </p:grpSpPr>
+      <p:sp>
+        <p:nvSpPr>
+          <p:cNvPr id="2" name="Title 1">
+            <a:extLst>
+              <a:ext uri="{FF2B5EF4-FFF2-40B4-BE49-F238E27FC236}">
                 <a16:creationId xmlns:a16="http://schemas.microsoft.com/office/drawing/2014/main" id="{6AF4413A-3986-6840-B221-C88A09AE7E6A}"/>
               </a:ext>
             </a:extLst>
@@ -5844,6 +6149,86 @@
 </file>
 
 <file path=ppt/slides/slide2.xml><?xml version="1.0" encoding="utf-8"?>
+<p:sld xmlns:a="http://schemas.openxmlformats.org/drawingml/2006/main" xmlns:r="http://schemas.openxmlformats.org/officeDocument/2006/relationships" xmlns:p="http://schemas.openxmlformats.org/presentationml/2006/main">
+  <p:cSld>
+    <p:spTree>
+      <p:nvGrpSpPr>
+        <p:cNvPr id="1" name=""/>
+        <p:cNvGrpSpPr/>
+        <p:nvPr/>
+      </p:nvGrpSpPr>
+      <p:grpSpPr>
+        <a:xfrm>
+          <a:off x="0" y="0"/>
+          <a:ext cx="0" cy="0"/>
+          <a:chOff x="0" y="0"/>
+          <a:chExt cx="0" cy="0"/>
+        </a:xfrm>
+      </p:grpSpPr>
+      <p:sp>
+        <p:nvSpPr>
+          <p:cNvPr id="2" name="Title 1">
+            <a:extLst>
+              <a:ext uri="{FF2B5EF4-FFF2-40B4-BE49-F238E27FC236}">
+                <a16:creationId xmlns:a16="http://schemas.microsoft.com/office/drawing/2014/main" id="{43ABBBAF-2D42-9842-9A92-C155EB0D6012}"/>
+              </a:ext>
+            </a:extLst>
+          </p:cNvPr>
+          <p:cNvSpPr>
+            <a:spLocks noGrp="1"/>
+          </p:cNvSpPr>
+          <p:nvPr>
+            <p:ph type="title"/>
+          </p:nvPr>
+        </p:nvSpPr>
+        <p:spPr/>
+        <p:txBody>
+          <a:bodyPr/>
+          <a:lstStyle/>
+          <a:p>
+            <a:endParaRPr lang="en-US"/>
+          </a:p>
+        </p:txBody>
+      </p:sp>
+      <p:sp>
+        <p:nvSpPr>
+          <p:cNvPr id="3" name="Content Placeholder 2">
+            <a:extLst>
+              <a:ext uri="{FF2B5EF4-FFF2-40B4-BE49-F238E27FC236}">
+                <a16:creationId xmlns:a16="http://schemas.microsoft.com/office/drawing/2014/main" id="{12A1F840-C120-7146-9B59-B7B14B1009F4}"/>
+              </a:ext>
+            </a:extLst>
+          </p:cNvPr>
+          <p:cNvSpPr>
+            <a:spLocks noGrp="1"/>
+          </p:cNvSpPr>
+          <p:nvPr>
+            <p:ph idx="1"/>
+          </p:nvPr>
+        </p:nvSpPr>
+        <p:spPr/>
+        <p:txBody>
+          <a:bodyPr/>
+          <a:lstStyle/>
+          <a:p>
+            <a:endParaRPr lang="en-US"/>
+          </a:p>
+        </p:txBody>
+      </p:sp>
+    </p:spTree>
+    <p:extLst>
+      <p:ext uri="{BB962C8B-B14F-4D97-AF65-F5344CB8AC3E}">
+        <p14:creationId xmlns:p14="http://schemas.microsoft.com/office/powerpoint/2010/main" val="2121267495"/>
+      </p:ext>
+    </p:extLst>
+  </p:cSld>
+  <p:clrMapOvr>
+    <a:masterClrMapping/>
+  </p:clrMapOvr>
+</p:sld>
+</file>
+
+<file path=ppt/slides/slide3.xml><?xml version="1.0" encoding="utf-8"?>
 <p:sld xmlns:a="http://schemas.openxmlformats.org/drawingml/2006/main" xmlns:r="http://schemas.openxmlformats.org/officeDocument/2006/relationships" xmlns:p="http://schemas.openxmlformats.org/presentationml/2006/main">
   <p:cSld>
     <p:bg>
@@ -6614,7 +6999,7 @@
 </p:sld>
 </file>
 
-<file path=ppt/slides/slide3.xml><?xml version="1.0" encoding="utf-8"?>
+<file path=ppt/slides/slide4.xml><?xml version="1.0" encoding="utf-8"?>
 <p:sld xmlns:a="http://schemas.openxmlformats.org/drawingml/2006/main" xmlns:r="http://schemas.openxmlformats.org/officeDocument/2006/relationships" xmlns:p="http://schemas.openxmlformats.org/presentationml/2006/main">
   <p:cSld>
     <p:bg>
@@ -7039,210 +7424,6 @@
     <p:extLst>
       <p:ext uri="{BB962C8B-B14F-4D97-AF65-F5344CB8AC3E}">
         <p14:creationId xmlns:p14="http://schemas.microsoft.com/office/powerpoint/2010/main" val="3471405673"/>
-      </p:ext>
-    </p:extLst>
-  </p:cSld>
-  <p:clrMapOvr>
-    <a:masterClrMapping/>
-  </p:clrMapOvr>
-</p:sld>
-</file>
-
-<file path=ppt/slides/slide4.xml><?xml version="1.0" encoding="utf-8"?>
-<p:sld xmlns:a="http://schemas.openxmlformats.org/drawingml/2006/main" xmlns:r="http://schemas.openxmlformats.org/officeDocument/2006/relationships" xmlns:p="http://schemas.openxmlformats.org/presentationml/2006/main">
-  <p:cSld>
-    <p:bg>
-      <p:bgPr>
-        <a:solidFill>
-          <a:schemeClr val="bg1"/>
-        </a:solidFill>
-        <a:effectLst/>
-      </p:bgPr>
-    </p:bg>
-    <p:spTree>
-      <p:nvGrpSpPr>
-        <p:cNvPr id="1" name=""/>
-        <p:cNvGrpSpPr/>
-        <p:nvPr/>
-      </p:nvGrpSpPr>
-      <p:grpSpPr>
-        <a:xfrm>
-          <a:off x="0" y="0"/>
-          <a:ext cx="0" cy="0"/>
-          <a:chOff x="0" y="0"/>
-          <a:chExt cx="0" cy="0"/>
-        </a:xfrm>
-      </p:grpSpPr>
-      <p:sp>
-        <p:nvSpPr>
-          <p:cNvPr id="26" name="Flowchart: Document 25">
-            <a:extLst>
-              <a:ext uri="{FF2B5EF4-FFF2-40B4-BE49-F238E27FC236}">
-                <a16:creationId xmlns:a16="http://schemas.microsoft.com/office/drawing/2014/main" id="{D12DDE76-C203-4047-9998-63900085B5E8}"/>
-              </a:ext>
-              <a:ext uri="{C183D7F6-B498-43B3-948B-1728B52AA6E4}">
-                <adec:decorative xmlns:adec="http://schemas.microsoft.com/office/drawing/2017/decorative" val="1"/>
-              </a:ext>
-            </a:extLst>
-          </p:cNvPr>
-          <p:cNvSpPr>
-            <a:spLocks noGrp="1" noRot="1" noChangeAspect="1" noMove="1" noResize="1" noEditPoints="1" noAdjustHandles="1" noChangeArrowheads="1" noChangeShapeType="1" noTextEdit="1"/>
-          </p:cNvSpPr>
-          <p:nvPr>
-            <p:extLst>
-              <p:ext uri="{386F3935-93C4-4BCD-93E2-E3B085C9AB24}">
-                <p16:designElem xmlns:p16="http://schemas.microsoft.com/office/powerpoint/2015/main" val="1"/>
-              </p:ext>
-            </p:extLst>
-          </p:nvPr>
-        </p:nvSpPr>
-        <p:spPr>
-          <a:xfrm>
-            <a:off x="638175" y="0"/>
-            <a:ext cx="3248025" cy="3400426"/>
-          </a:xfrm>
-          <a:prstGeom prst="flowChartDocument">
-            <a:avLst/>
-          </a:prstGeom>
-          <a:solidFill>
-            <a:schemeClr val="accent1"/>
-          </a:solidFill>
-          <a:ln>
-            <a:noFill/>
-          </a:ln>
-        </p:spPr>
-        <p:style>
-          <a:lnRef idx="2">
-            <a:schemeClr val="accent1">
-              <a:shade val="50000"/>
-            </a:schemeClr>
-          </a:lnRef>
-          <a:fillRef idx="1">
-            <a:schemeClr val="accent1"/>
-          </a:fillRef>
-          <a:effectRef idx="0">
-            <a:schemeClr val="accent1"/>
-          </a:effectRef>
-          <a:fontRef idx="minor">
-            <a:schemeClr val="lt1"/>
-          </a:fontRef>
-        </p:style>
-        <p:txBody>
-          <a:bodyPr rtlCol="0" anchor="ctr"/>
-          <a:lstStyle/>
-          <a:p>
-            <a:pPr algn="ctr"/>
-            <a:endParaRPr lang="en-US"/>
-          </a:p>
-        </p:txBody>
-      </p:sp>
-      <p:sp>
-        <p:nvSpPr>
-          <p:cNvPr id="2" name="Title 1"/>
-          <p:cNvSpPr>
-            <a:spLocks noGrp="1"/>
-          </p:cNvSpPr>
-          <p:nvPr>
-            <p:ph type="title"/>
-          </p:nvPr>
-        </p:nvSpPr>
-        <p:spPr>
-          <a:xfrm>
-            <a:off x="838200" y="171162"/>
-            <a:ext cx="2840182" cy="2371148"/>
-          </a:xfrm>
-        </p:spPr>
-        <p:txBody>
-          <a:bodyPr vert="horz" lIns="91440" tIns="45720" rIns="91440" bIns="45720" rtlCol="0" anchor="ctr">
-            <a:normAutofit/>
-          </a:bodyPr>
-          <a:lstStyle/>
-          <a:p>
-            <a:r>
-              <a:rPr lang="en-US" sz="3200" kern="1200">
-                <a:solidFill>
-                  <a:srgbClr val="FFFFFF"/>
-                </a:solidFill>
-                <a:latin typeface="+mj-lt"/>
-                <a:ea typeface="+mj-ea"/>
-                <a:cs typeface="+mj-cs"/>
-              </a:rPr>
-              <a:t>Profit Analysis</a:t>
-            </a:r>
-          </a:p>
-        </p:txBody>
-      </p:sp>
-      <p:pic>
-        <p:nvPicPr>
-          <p:cNvPr id="4" name="Content Placeholder 3">
-            <a:extLst>
-              <a:ext uri="{FF2B5EF4-FFF2-40B4-BE49-F238E27FC236}">
-                <a16:creationId xmlns:a16="http://schemas.microsoft.com/office/drawing/2014/main" id="{76F5E57D-9BDD-EE4F-AFF6-E2778AD4FA9D}"/>
-              </a:ext>
-            </a:extLst>
-          </p:cNvPr>
-          <p:cNvPicPr>
-            <a:picLocks noGrp="1" noChangeAspect="1"/>
-          </p:cNvPicPr>
-          <p:nvPr>
-            <p:ph idx="1"/>
-          </p:nvPr>
-        </p:nvPicPr>
-        <p:blipFill>
-          <a:blip r:embed="rId2"/>
-          <a:stretch>
-            <a:fillRect/>
-          </a:stretch>
-        </p:blipFill>
-        <p:spPr>
-          <a:xfrm>
-            <a:off x="4207933" y="670080"/>
-            <a:ext cx="7347537" cy="5518816"/>
-          </a:xfrm>
-          <a:prstGeom prst="rect">
-            <a:avLst/>
-          </a:prstGeom>
-        </p:spPr>
-      </p:pic>
-      <p:sp>
-        <p:nvSpPr>
-          <p:cNvPr id="5" name="TextBox 4">
-            <a:extLst>
-              <a:ext uri="{FF2B5EF4-FFF2-40B4-BE49-F238E27FC236}">
-                <a16:creationId xmlns:a16="http://schemas.microsoft.com/office/drawing/2014/main" id="{9773BD41-B803-4C43-A045-0C70381DBBBF}"/>
-              </a:ext>
-            </a:extLst>
-          </p:cNvPr>
-          <p:cNvSpPr txBox="1"/>
-          <p:nvPr/>
-        </p:nvSpPr>
-        <p:spPr>
-          <a:xfrm>
-            <a:off x="950495" y="3693695"/>
-            <a:ext cx="2935705" cy="1477328"/>
-          </a:xfrm>
-          <a:prstGeom prst="rect">
-            <a:avLst/>
-          </a:prstGeom>
-          <a:noFill/>
-        </p:spPr>
-        <p:txBody>
-          <a:bodyPr wrap="square" rtlCol="0">
-            <a:spAutoFit/>
-          </a:bodyPr>
-          <a:lstStyle/>
-          <a:p>
-            <a:r>
-              <a:rPr lang="en-US" dirty="0"/>
-              <a:t>We can see clearly that Yellow Cab  Company has more than double the  Average profit per km from 2016 to 2018</a:t>
-            </a:r>
-          </a:p>
-        </p:txBody>
-      </p:sp>
-    </p:spTree>
-    <p:extLst>
-      <p:ext uri="{BB962C8B-B14F-4D97-AF65-F5344CB8AC3E}">
-        <p14:creationId xmlns:p14="http://schemas.microsoft.com/office/powerpoint/2010/main" val="2856756673"/>
       </p:ext>
     </p:extLst>
   </p:cSld>
@@ -7363,7 +7544,7 @@
           <a:lstStyle/>
           <a:p>
             <a:r>
-              <a:rPr lang="en-US" sz="3000" kern="1200">
+              <a:rPr lang="en-US" sz="3200" kern="1200">
                 <a:solidFill>
                   <a:srgbClr val="FFFFFF"/>
                 </a:solidFill>
@@ -7371,7 +7552,7 @@
                 <a:ea typeface="+mj-ea"/>
                 <a:cs typeface="+mj-cs"/>
               </a:rPr>
-              <a:t>Gross Profit Percentage/Year</a:t>
+              <a:t>Profit Analysis</a:t>
             </a:r>
           </a:p>
         </p:txBody>
@@ -7381,7 +7562,7 @@
           <p:cNvPr id="4" name="Content Placeholder 3">
             <a:extLst>
               <a:ext uri="{FF2B5EF4-FFF2-40B4-BE49-F238E27FC236}">
-                <a16:creationId xmlns:a16="http://schemas.microsoft.com/office/drawing/2014/main" id="{96719F76-C3B8-9945-A396-B43DBC986946}"/>
+                <a16:creationId xmlns:a16="http://schemas.microsoft.com/office/drawing/2014/main" id="{76F5E57D-9BDD-EE4F-AFF6-E2778AD4FA9D}"/>
               </a:ext>
             </a:extLst>
           </p:cNvPr>
@@ -7400,8 +7581,8 @@
         </p:blipFill>
         <p:spPr>
           <a:xfrm>
-            <a:off x="4225205" y="640080"/>
-            <a:ext cx="7312993" cy="5578816"/>
+            <a:off x="4207933" y="670080"/>
+            <a:ext cx="7347537" cy="5518816"/>
           </a:xfrm>
           <a:prstGeom prst="rect">
             <a:avLst/>
@@ -7413,7 +7594,7 @@
           <p:cNvPr id="5" name="TextBox 4">
             <a:extLst>
               <a:ext uri="{FF2B5EF4-FFF2-40B4-BE49-F238E27FC236}">
-                <a16:creationId xmlns:a16="http://schemas.microsoft.com/office/drawing/2014/main" id="{894622EE-FB85-4245-82EA-FFEFCCF2822B}"/>
+                <a16:creationId xmlns:a16="http://schemas.microsoft.com/office/drawing/2014/main" id="{9773BD41-B803-4C43-A045-0C70381DBBBF}"/>
               </a:ext>
             </a:extLst>
           </p:cNvPr>
@@ -7422,8 +7603,8 @@
         </p:nvSpPr>
         <p:spPr>
           <a:xfrm>
-            <a:off x="638175" y="3729789"/>
-            <a:ext cx="3248025" cy="1200329"/>
+            <a:off x="950495" y="3693695"/>
+            <a:ext cx="2935705" cy="1477328"/>
           </a:xfrm>
           <a:prstGeom prst="rect">
             <a:avLst/>
@@ -7438,7 +7619,7 @@
           <a:p>
             <a:r>
               <a:rPr lang="en-US" dirty="0"/>
-              <a:t>We can see that Yellow Cab company has double the profit percentage average per year than Pink Cab</a:t>
+              <a:t>We can see clearly that Yellow Cab  Company has more than double the  Average profit per km from 2016 to 2018</a:t>
             </a:r>
           </a:p>
         </p:txBody>
@@ -7446,7 +7627,7 @@
     </p:spTree>
     <p:extLst>
       <p:ext uri="{BB962C8B-B14F-4D97-AF65-F5344CB8AC3E}">
-        <p14:creationId xmlns:p14="http://schemas.microsoft.com/office/powerpoint/2010/main" val="4096145169"/>
+        <p14:creationId xmlns:p14="http://schemas.microsoft.com/office/powerpoint/2010/main" val="2856756673"/>
       </p:ext>
     </p:extLst>
   </p:cSld>
@@ -7483,10 +7664,10 @@
       </p:grpSpPr>
       <p:sp>
         <p:nvSpPr>
-          <p:cNvPr id="26" name="Down Arrow 7">
-            <a:extLst>
-              <a:ext uri="{FF2B5EF4-FFF2-40B4-BE49-F238E27FC236}">
-                <a16:creationId xmlns:a16="http://schemas.microsoft.com/office/drawing/2014/main" id="{D4771268-CB57-404A-9271-370EB28F6090}"/>
+          <p:cNvPr id="26" name="Flowchart: Document 25">
+            <a:extLst>
+              <a:ext uri="{FF2B5EF4-FFF2-40B4-BE49-F238E27FC236}">
+                <a16:creationId xmlns:a16="http://schemas.microsoft.com/office/drawing/2014/main" id="{D12DDE76-C203-4047-9998-63900085B5E8}"/>
               </a:ext>
               <a:ext uri="{C183D7F6-B498-43B3-948B-1728B52AA6E4}">
                 <adec:decorative xmlns:adec="http://schemas.microsoft.com/office/drawing/2017/decorative" val="1"/>
@@ -7505,20 +7686,17 @@
           </p:nvPr>
         </p:nvSpPr>
         <p:spPr>
-          <a:xfrm rot="16200000">
-            <a:off x="800100" y="1491343"/>
-            <a:ext cx="3333749" cy="3499103"/>
-          </a:xfrm>
-          <a:prstGeom prst="downArrow">
-            <a:avLst>
-              <a:gd name="adj1" fmla="val 100000"/>
-              <a:gd name="adj2" fmla="val 15788"/>
-            </a:avLst>
+          <a:xfrm>
+            <a:off x="638175" y="0"/>
+            <a:ext cx="3248025" cy="3400426"/>
+          </a:xfrm>
+          <a:prstGeom prst="flowChartDocument">
+            <a:avLst/>
           </a:prstGeom>
           <a:solidFill>
-            <a:srgbClr val="404040"/>
+            <a:schemeClr val="accent1"/>
           </a:solidFill>
-          <a:ln w="53975">
+          <a:ln>
             <a:noFill/>
           </a:ln>
         </p:spPr>
@@ -7559,10 +7737,9 @@
         </p:nvSpPr>
         <p:spPr>
           <a:xfrm>
-            <a:off x="1028700" y="1967266"/>
-            <a:ext cx="2628900" cy="2547257"/>
-          </a:xfrm>
-          <a:noFill/>
+            <a:off x="838200" y="171162"/>
+            <a:ext cx="2840182" cy="2371148"/>
+          </a:xfrm>
         </p:spPr>
         <p:txBody>
           <a:bodyPr vert="horz" lIns="91440" tIns="45720" rIns="91440" bIns="45720" rtlCol="0" anchor="ctr">
@@ -7570,9 +7747,8 @@
           </a:bodyPr>
           <a:lstStyle/>
           <a:p>
-            <a:pPr algn="ctr"/>
-            <a:r>
-              <a:rPr lang="en-US" sz="3600" kern="1200">
+            <a:r>
+              <a:rPr lang="en-US" sz="3000" kern="1200">
                 <a:solidFill>
                   <a:srgbClr val="FFFFFF"/>
                 </a:solidFill>
@@ -7580,7 +7756,7 @@
                 <a:ea typeface="+mj-ea"/>
                 <a:cs typeface="+mj-cs"/>
               </a:rPr>
-              <a:t>Gross Profit Percentage Per City</a:t>
+              <a:t>Gross Profit Percentage/Year</a:t>
             </a:r>
           </a:p>
         </p:txBody>
@@ -7590,7 +7766,7 @@
           <p:cNvPr id="4" name="Content Placeholder 3">
             <a:extLst>
               <a:ext uri="{FF2B5EF4-FFF2-40B4-BE49-F238E27FC236}">
-                <a16:creationId xmlns:a16="http://schemas.microsoft.com/office/drawing/2014/main" id="{696EC66E-8DCE-6541-AEC1-E24BD81EC0A2}"/>
+                <a16:creationId xmlns:a16="http://schemas.microsoft.com/office/drawing/2014/main" id="{96719F76-C3B8-9945-A396-B43DBC986946}"/>
               </a:ext>
             </a:extLst>
           </p:cNvPr>
@@ -7602,15 +7778,15 @@
           </p:nvPr>
         </p:nvPicPr>
         <p:blipFill>
-          <a:blip r:embed="rId3"/>
+          <a:blip r:embed="rId2"/>
           <a:stretch>
             <a:fillRect/>
           </a:stretch>
         </p:blipFill>
         <p:spPr>
           <a:xfrm>
-            <a:off x="4777316" y="774887"/>
-            <a:ext cx="6780700" cy="5305896"/>
+            <a:off x="4225205" y="640080"/>
+            <a:ext cx="7312993" cy="5578816"/>
           </a:xfrm>
           <a:prstGeom prst="rect">
             <a:avLst/>
@@ -7622,7 +7798,7 @@
           <p:cNvPr id="5" name="TextBox 4">
             <a:extLst>
               <a:ext uri="{FF2B5EF4-FFF2-40B4-BE49-F238E27FC236}">
-                <a16:creationId xmlns:a16="http://schemas.microsoft.com/office/drawing/2014/main" id="{D3A4D028-1380-5A4D-9FA4-FB203A077C5F}"/>
+                <a16:creationId xmlns:a16="http://schemas.microsoft.com/office/drawing/2014/main" id="{894622EE-FB85-4245-82EA-FFEFCCF2822B}"/>
               </a:ext>
             </a:extLst>
           </p:cNvPr>
@@ -7631,8 +7807,8 @@
         </p:nvSpPr>
         <p:spPr>
           <a:xfrm>
-            <a:off x="717422" y="5113421"/>
-            <a:ext cx="3499104" cy="1754326"/>
+            <a:off x="638175" y="3729789"/>
+            <a:ext cx="3248025" cy="1200329"/>
           </a:xfrm>
           <a:prstGeom prst="rect">
             <a:avLst/>
@@ -7647,7 +7823,7 @@
           <a:p>
             <a:r>
               <a:rPr lang="en-US" dirty="0"/>
-              <a:t>Here, we can see the gross profit average per city from each company, we can see that the Yellow Cab company has better gross profit percentage in every city but Tucson, Az.</a:t>
+              <a:t>We can see that Yellow Cab company has double the profit percentage average per year than Pink Cab</a:t>
             </a:r>
           </a:p>
         </p:txBody>
@@ -7655,7 +7831,7 @@
     </p:spTree>
     <p:extLst>
       <p:ext uri="{BB962C8B-B14F-4D97-AF65-F5344CB8AC3E}">
-        <p14:creationId xmlns:p14="http://schemas.microsoft.com/office/powerpoint/2010/main" val="197102489"/>
+        <p14:creationId xmlns:p14="http://schemas.microsoft.com/office/powerpoint/2010/main" val="4096145169"/>
       </p:ext>
     </p:extLst>
   </p:cSld>
@@ -7692,10 +7868,10 @@
       </p:grpSpPr>
       <p:sp>
         <p:nvSpPr>
-          <p:cNvPr id="23" name="Rectangle 22">
-            <a:extLst>
-              <a:ext uri="{FF2B5EF4-FFF2-40B4-BE49-F238E27FC236}">
-                <a16:creationId xmlns:a16="http://schemas.microsoft.com/office/drawing/2014/main" id="{A4AC5506-6312-4701-8D3C-40187889A947}"/>
+          <p:cNvPr id="26" name="Down Arrow 7">
+            <a:extLst>
+              <a:ext uri="{FF2B5EF4-FFF2-40B4-BE49-F238E27FC236}">
+                <a16:creationId xmlns:a16="http://schemas.microsoft.com/office/drawing/2014/main" id="{D4771268-CB57-404A-9271-370EB28F6090}"/>
               </a:ext>
               <a:ext uri="{C183D7F6-B498-43B3-948B-1728B52AA6E4}">
                 <adec:decorative xmlns:adec="http://schemas.microsoft.com/office/drawing/2017/decorative" val="1"/>
@@ -7714,17 +7890,20 @@
           </p:nvPr>
         </p:nvSpPr>
         <p:spPr>
-          <a:xfrm>
-            <a:off x="0" y="651752"/>
-            <a:ext cx="12192000" cy="736551"/>
-          </a:xfrm>
-          <a:prstGeom prst="rect">
-            <a:avLst/>
+          <a:xfrm rot="16200000">
+            <a:off x="800100" y="1491343"/>
+            <a:ext cx="3333749" cy="3499103"/>
+          </a:xfrm>
+          <a:prstGeom prst="downArrow">
+            <a:avLst>
+              <a:gd name="adj1" fmla="val 100000"/>
+              <a:gd name="adj2" fmla="val 15788"/>
+            </a:avLst>
           </a:prstGeom>
           <a:solidFill>
-            <a:schemeClr val="tx1"/>
+            <a:srgbClr val="404040"/>
           </a:solidFill>
-          <a:ln>
+          <a:ln w="53975">
             <a:noFill/>
           </a:ln>
         </p:spPr>
@@ -7765,9 +7944,10 @@
         </p:nvSpPr>
         <p:spPr>
           <a:xfrm>
-            <a:off x="556532" y="643467"/>
-            <a:ext cx="11210925" cy="744836"/>
-          </a:xfrm>
+            <a:off x="1028700" y="1967266"/>
+            <a:ext cx="2628900" cy="2547257"/>
+          </a:xfrm>
+          <a:noFill/>
         </p:spPr>
         <p:txBody>
           <a:bodyPr vert="horz" lIns="91440" tIns="45720" rIns="91440" bIns="45720" rtlCol="0" anchor="ctr">
@@ -7777,25 +7957,25 @@
           <a:p>
             <a:pPr algn="ctr"/>
             <a:r>
-              <a:rPr lang="en-US" sz="3200" kern="1200">
+              <a:rPr lang="en-US" sz="3600" kern="1200">
                 <a:solidFill>
-                  <a:schemeClr val="bg1"/>
+                  <a:srgbClr val="FFFFFF"/>
                 </a:solidFill>
                 <a:latin typeface="+mj-lt"/>
                 <a:ea typeface="+mj-ea"/>
                 <a:cs typeface="+mj-cs"/>
               </a:rPr>
-              <a:t>Average Profit per KM daily</a:t>
+              <a:t>Gross Profit Percentage Per City</a:t>
             </a:r>
           </a:p>
         </p:txBody>
       </p:sp>
       <p:pic>
         <p:nvPicPr>
-          <p:cNvPr id="6" name="Content Placeholder 5">
-            <a:extLst>
-              <a:ext uri="{FF2B5EF4-FFF2-40B4-BE49-F238E27FC236}">
-                <a16:creationId xmlns:a16="http://schemas.microsoft.com/office/drawing/2014/main" id="{39C93EB6-6709-8E44-BEBD-44665BE65A2E}"/>
+          <p:cNvPr id="4" name="Content Placeholder 3">
+            <a:extLst>
+              <a:ext uri="{FF2B5EF4-FFF2-40B4-BE49-F238E27FC236}">
+                <a16:creationId xmlns:a16="http://schemas.microsoft.com/office/drawing/2014/main" id="{696EC66E-8DCE-6541-AEC1-E24BD81EC0A2}"/>
               </a:ext>
             </a:extLst>
           </p:cNvPr>
@@ -7814,8 +7994,8 @@
         </p:blipFill>
         <p:spPr>
           <a:xfrm>
-            <a:off x="1074057" y="1675227"/>
-            <a:ext cx="10043886" cy="4394199"/>
+            <a:off x="4777316" y="774887"/>
+            <a:ext cx="6780700" cy="5305896"/>
           </a:xfrm>
           <a:prstGeom prst="rect">
             <a:avLst/>
@@ -7824,10 +8004,10 @@
       </p:pic>
       <p:sp>
         <p:nvSpPr>
-          <p:cNvPr id="9" name="TextBox 8">
-            <a:extLst>
-              <a:ext uri="{FF2B5EF4-FFF2-40B4-BE49-F238E27FC236}">
-                <a16:creationId xmlns:a16="http://schemas.microsoft.com/office/drawing/2014/main" id="{F42CE57A-9CD0-EC45-87F8-FBA4556EF9F2}"/>
+          <p:cNvPr id="5" name="TextBox 4">
+            <a:extLst>
+              <a:ext uri="{FF2B5EF4-FFF2-40B4-BE49-F238E27FC236}">
+                <a16:creationId xmlns:a16="http://schemas.microsoft.com/office/drawing/2014/main" id="{D3A4D028-1380-5A4D-9FA4-FB203A077C5F}"/>
               </a:ext>
             </a:extLst>
           </p:cNvPr>
@@ -7836,8 +8016,8 @@
         </p:nvSpPr>
         <p:spPr>
           <a:xfrm>
-            <a:off x="1755648" y="6135624"/>
-            <a:ext cx="7863840" cy="646331"/>
+            <a:off x="717422" y="5113421"/>
+            <a:ext cx="3499104" cy="1754326"/>
           </a:xfrm>
           <a:prstGeom prst="rect">
             <a:avLst/>
@@ -7852,13 +8032,7 @@
           <a:p>
             <a:r>
               <a:rPr lang="en-US" dirty="0"/>
-              <a:t>Here, we can see the average profit per km daily(from Monday through Sunday).</a:t>
-            </a:r>
-          </a:p>
-          <a:p>
-            <a:r>
-              <a:rPr lang="en-US" dirty="0"/>
-              <a:t>We can see that the days the companies gain more profit is on Saturdays.</a:t>
+              <a:t>Here, we can see the gross profit average per city from each company, we can see that the Yellow Cab company has better gross profit percentage in every city but Tucson, Az.</a:t>
             </a:r>
           </a:p>
         </p:txBody>
@@ -7866,7 +8040,7 @@
     </p:spTree>
     <p:extLst>
       <p:ext uri="{BB962C8B-B14F-4D97-AF65-F5344CB8AC3E}">
-        <p14:creationId xmlns:p14="http://schemas.microsoft.com/office/powerpoint/2010/main" val="432509895"/>
+        <p14:creationId xmlns:p14="http://schemas.microsoft.com/office/powerpoint/2010/main" val="197102489"/>
       </p:ext>
     </p:extLst>
   </p:cSld>
@@ -7903,10 +8077,10 @@
       </p:grpSpPr>
       <p:sp>
         <p:nvSpPr>
-          <p:cNvPr id="23" name="Rectangle 8">
-            <a:extLst>
-              <a:ext uri="{FF2B5EF4-FFF2-40B4-BE49-F238E27FC236}">
-                <a16:creationId xmlns:a16="http://schemas.microsoft.com/office/drawing/2014/main" id="{32BC26D8-82FB-445E-AA49-62A77D7C1EE0}"/>
+          <p:cNvPr id="23" name="Rectangle 22">
+            <a:extLst>
+              <a:ext uri="{FF2B5EF4-FFF2-40B4-BE49-F238E27FC236}">
+                <a16:creationId xmlns:a16="http://schemas.microsoft.com/office/drawing/2014/main" id="{A4AC5506-6312-4701-8D3C-40187889A947}"/>
               </a:ext>
               <a:ext uri="{C183D7F6-B498-43B3-948B-1728B52AA6E4}">
                 <adec:decorative xmlns:adec="http://schemas.microsoft.com/office/drawing/2017/decorative" val="1"/>
@@ -7926,17 +8100,14 @@
         </p:nvSpPr>
         <p:spPr>
           <a:xfrm>
-            <a:off x="0" y="0"/>
-            <a:ext cx="12192000" cy="6858000"/>
+            <a:off x="0" y="651752"/>
+            <a:ext cx="12192000" cy="736551"/>
           </a:xfrm>
           <a:prstGeom prst="rect">
             <a:avLst/>
           </a:prstGeom>
           <a:solidFill>
-            <a:schemeClr val="tx1">
-              <a:lumMod val="65000"/>
-              <a:lumOff val="35000"/>
-            </a:schemeClr>
+            <a:schemeClr val="tx1"/>
           </a:solidFill>
           <a:ln>
             <a:noFill/>
@@ -7969,73 +8140,47 @@
       </p:sp>
       <p:sp>
         <p:nvSpPr>
-          <p:cNvPr id="24" name="Rectangle 10">
-            <a:extLst>
-              <a:ext uri="{FF2B5EF4-FFF2-40B4-BE49-F238E27FC236}">
-                <a16:creationId xmlns:a16="http://schemas.microsoft.com/office/drawing/2014/main" id="{CB44330D-EA18-4254-AA95-EB49948539B8}"/>
-              </a:ext>
-              <a:ext uri="{C183D7F6-B498-43B3-948B-1728B52AA6E4}">
-                <adec:decorative xmlns:adec="http://schemas.microsoft.com/office/drawing/2017/decorative" val="1"/>
-              </a:ext>
-            </a:extLst>
-          </p:cNvPr>
-          <p:cNvSpPr>
-            <a:spLocks noGrp="1" noRot="1" noChangeAspect="1" noMove="1" noResize="1" noEditPoints="1" noAdjustHandles="1" noChangeArrowheads="1" noChangeShapeType="1" noTextEdit="1"/>
-          </p:cNvSpPr>
-          <p:nvPr>
-            <p:extLst>
-              <p:ext uri="{386F3935-93C4-4BCD-93E2-E3B085C9AB24}">
-                <p16:designElem xmlns:p16="http://schemas.microsoft.com/office/powerpoint/2015/main" val="1"/>
-              </p:ext>
-            </p:extLst>
+          <p:cNvPr id="2" name="Title 1"/>
+          <p:cNvSpPr>
+            <a:spLocks noGrp="1"/>
+          </p:cNvSpPr>
+          <p:nvPr>
+            <p:ph type="title"/>
           </p:nvPr>
         </p:nvSpPr>
         <p:spPr>
           <a:xfrm>
-            <a:off x="477012" y="480060"/>
-            <a:ext cx="11237976" cy="5897880"/>
-          </a:xfrm>
-          <a:prstGeom prst="rect">
-            <a:avLst/>
-          </a:prstGeom>
-          <a:solidFill>
-            <a:srgbClr val="FFFFFF"/>
-          </a:solidFill>
-          <a:ln>
-            <a:noFill/>
-          </a:ln>
-        </p:spPr>
-        <p:style>
-          <a:lnRef idx="2">
-            <a:schemeClr val="accent1">
-              <a:shade val="50000"/>
-            </a:schemeClr>
-          </a:lnRef>
-          <a:fillRef idx="1">
-            <a:schemeClr val="accent1"/>
-          </a:fillRef>
-          <a:effectRef idx="0">
-            <a:schemeClr val="accent1"/>
-          </a:effectRef>
-          <a:fontRef idx="minor">
-            <a:schemeClr val="lt1"/>
-          </a:fontRef>
-        </p:style>
-        <p:txBody>
-          <a:bodyPr rtlCol="0" anchor="ctr"/>
+            <a:off x="556532" y="643467"/>
+            <a:ext cx="11210925" cy="744836"/>
+          </a:xfrm>
+        </p:spPr>
+        <p:txBody>
+          <a:bodyPr vert="horz" lIns="91440" tIns="45720" rIns="91440" bIns="45720" rtlCol="0" anchor="ctr">
+            <a:normAutofit/>
+          </a:bodyPr>
           <a:lstStyle/>
           <a:p>
             <a:pPr algn="ctr"/>
-            <a:endParaRPr lang="en-US"/>
+            <a:r>
+              <a:rPr lang="en-US" sz="3200" kern="1200">
+                <a:solidFill>
+                  <a:schemeClr val="bg1"/>
+                </a:solidFill>
+                <a:latin typeface="+mj-lt"/>
+                <a:ea typeface="+mj-ea"/>
+                <a:cs typeface="+mj-cs"/>
+              </a:rPr>
+              <a:t>Average Profit per KM daily</a:t>
+            </a:r>
           </a:p>
         </p:txBody>
       </p:sp>
       <p:pic>
         <p:nvPicPr>
-          <p:cNvPr id="4" name="Content Placeholder 3">
-            <a:extLst>
-              <a:ext uri="{FF2B5EF4-FFF2-40B4-BE49-F238E27FC236}">
-                <a16:creationId xmlns:a16="http://schemas.microsoft.com/office/drawing/2014/main" id="{F8684409-31EF-E14E-8933-4B568A91F61A}"/>
+          <p:cNvPr id="6" name="Content Placeholder 5">
+            <a:extLst>
+              <a:ext uri="{FF2B5EF4-FFF2-40B4-BE49-F238E27FC236}">
+                <a16:creationId xmlns:a16="http://schemas.microsoft.com/office/drawing/2014/main" id="{39C93EB6-6709-8E44-BEBD-44665BE65A2E}"/>
               </a:ext>
             </a:extLst>
           </p:cNvPr>
@@ -8047,15 +8192,15 @@
           </p:nvPr>
         </p:nvPicPr>
         <p:blipFill>
-          <a:blip r:embed="rId2"/>
+          <a:blip r:embed="rId3"/>
           <a:stretch>
             <a:fillRect/>
           </a:stretch>
         </p:blipFill>
         <p:spPr>
           <a:xfrm>
-            <a:off x="2058995" y="643467"/>
-            <a:ext cx="8074010" cy="5571066"/>
+            <a:off x="1074057" y="1675227"/>
+            <a:ext cx="10043886" cy="4394199"/>
           </a:xfrm>
           <a:prstGeom prst="rect">
             <a:avLst/>
@@ -8064,10 +8209,10 @@
       </p:pic>
       <p:sp>
         <p:nvSpPr>
-          <p:cNvPr id="5" name="TextBox 4">
-            <a:extLst>
-              <a:ext uri="{FF2B5EF4-FFF2-40B4-BE49-F238E27FC236}">
-                <a16:creationId xmlns:a16="http://schemas.microsoft.com/office/drawing/2014/main" id="{91A4BEE7-3FC4-9049-92E9-81F6F1C97A1A}"/>
+          <p:cNvPr id="9" name="TextBox 8">
+            <a:extLst>
+              <a:ext uri="{FF2B5EF4-FFF2-40B4-BE49-F238E27FC236}">
+                <a16:creationId xmlns:a16="http://schemas.microsoft.com/office/drawing/2014/main" id="{F42CE57A-9CD0-EC45-87F8-FBA4556EF9F2}"/>
               </a:ext>
             </a:extLst>
           </p:cNvPr>
@@ -8076,8 +8221,8 @@
         </p:nvSpPr>
         <p:spPr>
           <a:xfrm>
-            <a:off x="667512" y="886968"/>
-            <a:ext cx="1391483" cy="3416320"/>
+            <a:off x="1755648" y="6135624"/>
+            <a:ext cx="7863840" cy="646331"/>
           </a:xfrm>
           <a:prstGeom prst="rect">
             <a:avLst/>
@@ -8092,7 +8237,13 @@
           <a:p>
             <a:r>
               <a:rPr lang="en-US" dirty="0"/>
-              <a:t>Here, we can see that the month with the most Gross Profit for the Yellow Cab company is May, and for the Pink Cab company is December</a:t>
+              <a:t>Here, we can see the average profit per km daily(from Monday through Sunday).</a:t>
+            </a:r>
+          </a:p>
+          <a:p>
+            <a:r>
+              <a:rPr lang="en-US" dirty="0"/>
+              <a:t>We can see that the days the companies gain more profit is on Saturdays.</a:t>
             </a:r>
           </a:p>
         </p:txBody>
@@ -8100,7 +8251,7 @@
     </p:spTree>
     <p:extLst>
       <p:ext uri="{BB962C8B-B14F-4D97-AF65-F5344CB8AC3E}">
-        <p14:creationId xmlns:p14="http://schemas.microsoft.com/office/powerpoint/2010/main" val="832134352"/>
+        <p14:creationId xmlns:p14="http://schemas.microsoft.com/office/powerpoint/2010/main" val="432509895"/>
       </p:ext>
     </p:extLst>
   </p:cSld>
@@ -8137,10 +8288,10 @@
       </p:grpSpPr>
       <p:sp>
         <p:nvSpPr>
-          <p:cNvPr id="9" name="Rectangle 8">
-            <a:extLst>
-              <a:ext uri="{FF2B5EF4-FFF2-40B4-BE49-F238E27FC236}">
-                <a16:creationId xmlns:a16="http://schemas.microsoft.com/office/drawing/2014/main" id="{23962611-DFD5-4092-AAFD-559E3DFCE2C9}"/>
+          <p:cNvPr id="23" name="Rectangle 8">
+            <a:extLst>
+              <a:ext uri="{FF2B5EF4-FFF2-40B4-BE49-F238E27FC236}">
+                <a16:creationId xmlns:a16="http://schemas.microsoft.com/office/drawing/2014/main" id="{32BC26D8-82FB-445E-AA49-62A77D7C1EE0}"/>
               </a:ext>
               <a:ext uri="{C183D7F6-B498-43B3-948B-1728B52AA6E4}">
                 <adec:decorative xmlns:adec="http://schemas.microsoft.com/office/drawing/2017/decorative" val="1"/>
@@ -8160,37 +8311,18 @@
         </p:nvSpPr>
         <p:spPr>
           <a:xfrm>
-            <a:off x="475488" y="0"/>
-            <a:ext cx="10910292" cy="6858000"/>
+            <a:off x="0" y="0"/>
+            <a:ext cx="12192000" cy="6858000"/>
           </a:xfrm>
           <a:prstGeom prst="rect">
             <a:avLst/>
           </a:prstGeom>
-          <a:gradFill>
-            <a:gsLst>
-              <a:gs pos="0">
-                <a:schemeClr val="accent1">
-                  <a:lumMod val="90000"/>
-                </a:schemeClr>
-              </a:gs>
-              <a:gs pos="25000">
-                <a:schemeClr val="accent1">
-                  <a:lumMod val="90000"/>
-                </a:schemeClr>
-              </a:gs>
-              <a:gs pos="94000">
-                <a:schemeClr val="bg2">
-                  <a:lumMod val="25000"/>
-                </a:schemeClr>
-              </a:gs>
-              <a:gs pos="100000">
-                <a:schemeClr val="bg2">
-                  <a:lumMod val="25000"/>
-                </a:schemeClr>
-              </a:gs>
-            </a:gsLst>
-            <a:lin ang="4200000" scaled="0"/>
-          </a:gradFill>
+          <a:solidFill>
+            <a:schemeClr val="tx1">
+              <a:lumMod val="65000"/>
+              <a:lumOff val="35000"/>
+            </a:schemeClr>
+          </a:solidFill>
           <a:ln>
             <a:noFill/>
           </a:ln>
@@ -8220,21 +8352,21 @@
           </a:p>
         </p:txBody>
       </p:sp>
-      <p:pic>
-        <p:nvPicPr>
-          <p:cNvPr id="11" name="Picture 10">
-            <a:extLst>
-              <a:ext uri="{FF2B5EF4-FFF2-40B4-BE49-F238E27FC236}">
-                <a16:creationId xmlns:a16="http://schemas.microsoft.com/office/drawing/2014/main" id="{2270F1FA-0425-408F-9861-80BF5AFB276D}"/>
+      <p:sp>
+        <p:nvSpPr>
+          <p:cNvPr id="24" name="Rectangle 10">
+            <a:extLst>
+              <a:ext uri="{FF2B5EF4-FFF2-40B4-BE49-F238E27FC236}">
+                <a16:creationId xmlns:a16="http://schemas.microsoft.com/office/drawing/2014/main" id="{CB44330D-EA18-4254-AA95-EB49948539B8}"/>
               </a:ext>
               <a:ext uri="{C183D7F6-B498-43B3-948B-1728B52AA6E4}">
                 <adec:decorative xmlns:adec="http://schemas.microsoft.com/office/drawing/2017/decorative" val="1"/>
               </a:ext>
             </a:extLst>
           </p:cNvPr>
-          <p:cNvPicPr>
-            <a:picLocks noGrp="1" noRot="1" noChangeAspect="1" noMove="1" noResize="1" noEditPoints="1" noAdjustHandles="1" noChangeArrowheads="1" noChangeShapeType="1" noCrop="1"/>
-          </p:cNvPicPr>
+          <p:cNvSpPr>
+            <a:spLocks noGrp="1" noRot="1" noChangeAspect="1" noMove="1" noResize="1" noEditPoints="1" noAdjustHandles="1" noChangeArrowheads="1" noChangeShapeType="1" noTextEdit="1"/>
+          </p:cNvSpPr>
           <p:nvPr>
             <p:extLst>
               <p:ext uri="{386F3935-93C4-4BCD-93E2-E3B085C9AB24}">
@@ -8242,23 +8374,73 @@
               </p:ext>
             </p:extLst>
           </p:nvPr>
+        </p:nvSpPr>
+        <p:spPr>
+          <a:xfrm>
+            <a:off x="477012" y="480060"/>
+            <a:ext cx="11237976" cy="5897880"/>
+          </a:xfrm>
+          <a:prstGeom prst="rect">
+            <a:avLst/>
+          </a:prstGeom>
+          <a:solidFill>
+            <a:srgbClr val="FFFFFF"/>
+          </a:solidFill>
+          <a:ln>
+            <a:noFill/>
+          </a:ln>
+        </p:spPr>
+        <p:style>
+          <a:lnRef idx="2">
+            <a:schemeClr val="accent1">
+              <a:shade val="50000"/>
+            </a:schemeClr>
+          </a:lnRef>
+          <a:fillRef idx="1">
+            <a:schemeClr val="accent1"/>
+          </a:fillRef>
+          <a:effectRef idx="0">
+            <a:schemeClr val="accent1"/>
+          </a:effectRef>
+          <a:fontRef idx="minor">
+            <a:schemeClr val="lt1"/>
+          </a:fontRef>
+        </p:style>
+        <p:txBody>
+          <a:bodyPr rtlCol="0" anchor="ctr"/>
+          <a:lstStyle/>
+          <a:p>
+            <a:pPr algn="ctr"/>
+            <a:endParaRPr lang="en-US"/>
+          </a:p>
+        </p:txBody>
+      </p:sp>
+      <p:pic>
+        <p:nvPicPr>
+          <p:cNvPr id="4" name="Content Placeholder 3">
+            <a:extLst>
+              <a:ext uri="{FF2B5EF4-FFF2-40B4-BE49-F238E27FC236}">
+                <a16:creationId xmlns:a16="http://schemas.microsoft.com/office/drawing/2014/main" id="{F8684409-31EF-E14E-8933-4B568A91F61A}"/>
+              </a:ext>
+            </a:extLst>
+          </p:cNvPr>
+          <p:cNvPicPr>
+            <a:picLocks noGrp="1" noChangeAspect="1"/>
+          </p:cNvPicPr>
+          <p:nvPr>
+            <p:ph idx="1"/>
+          </p:nvPr>
         </p:nvPicPr>
         <p:blipFill>
-          <a:blip r:embed="rId3">
-            <a:extLst>
-              <a:ext uri="{28A0092B-C50C-407E-A947-70E740481C1C}">
-                <a14:useLocalDpi xmlns:a14="http://schemas.microsoft.com/office/drawing/2010/main" val="0"/>
-              </a:ext>
-            </a:extLst>
-          </a:blip>
+          <a:blip r:embed="rId2"/>
           <a:stretch>
             <a:fillRect/>
           </a:stretch>
         </p:blipFill>
         <p:spPr>
           <a:xfrm>
-            <a:off x="0" y="0"/>
-            <a:ext cx="12192000" cy="6858000"/>
+            <a:off x="2058995" y="643467"/>
+            <a:ext cx="8074010" cy="5571066"/>
           </a:xfrm>
           <a:prstGeom prst="rect">
             <a:avLst/>
@@ -8267,37 +8449,35 @@
       </p:pic>
       <p:sp>
         <p:nvSpPr>
-          <p:cNvPr id="2" name="Title 1"/>
-          <p:cNvSpPr>
-            <a:spLocks noGrp="1"/>
-          </p:cNvSpPr>
-          <p:nvPr>
-            <p:ph type="title"/>
-          </p:nvPr>
+          <p:cNvPr id="5" name="TextBox 4">
+            <a:extLst>
+              <a:ext uri="{FF2B5EF4-FFF2-40B4-BE49-F238E27FC236}">
+                <a16:creationId xmlns:a16="http://schemas.microsoft.com/office/drawing/2014/main" id="{91A4BEE7-3FC4-9049-92E9-81F6F1C97A1A}"/>
+              </a:ext>
+            </a:extLst>
+          </p:cNvPr>
+          <p:cNvSpPr txBox="1"/>
+          <p:nvPr/>
         </p:nvSpPr>
         <p:spPr>
           <a:xfrm>
-            <a:off x="3045368" y="2043663"/>
-            <a:ext cx="6105194" cy="2031055"/>
-          </a:xfrm>
-        </p:spPr>
-        <p:txBody>
-          <a:bodyPr vert="horz" lIns="91440" tIns="45720" rIns="91440" bIns="45720" rtlCol="0" anchor="b">
-            <a:normAutofit/>
+            <a:off x="667512" y="886968"/>
+            <a:ext cx="1391483" cy="3416320"/>
+          </a:xfrm>
+          <a:prstGeom prst="rect">
+            <a:avLst/>
+          </a:prstGeom>
+          <a:noFill/>
+        </p:spPr>
+        <p:txBody>
+          <a:bodyPr wrap="square" rtlCol="0">
+            <a:spAutoFit/>
           </a:bodyPr>
           <a:lstStyle/>
           <a:p>
-            <a:pPr algn="ctr"/>
-            <a:r>
-              <a:rPr lang="en-US" sz="6000" kern="1200" dirty="0">
-                <a:solidFill>
-                  <a:srgbClr val="FFFFFF"/>
-                </a:solidFill>
-                <a:latin typeface="+mj-lt"/>
-                <a:ea typeface="+mj-ea"/>
-                <a:cs typeface="+mj-cs"/>
-              </a:rPr>
-              <a:t>Age group</a:t>
+            <a:r>
+              <a:rPr lang="en-US" dirty="0"/>
+              <a:t>Here, we can see that the month with the most Gross Profit for the Yellow Cab company is May, and for the Pink Cab company is December</a:t>
             </a:r>
           </a:p>
         </p:txBody>
@@ -8305,7 +8485,7 @@
     </p:spTree>
     <p:extLst>
       <p:ext uri="{BB962C8B-B14F-4D97-AF65-F5344CB8AC3E}">
-        <p14:creationId xmlns:p14="http://schemas.microsoft.com/office/powerpoint/2010/main" val="1334088900"/>
+        <p14:creationId xmlns:p14="http://schemas.microsoft.com/office/powerpoint/2010/main" val="832134352"/>
       </p:ext>
     </p:extLst>
   </p:cSld>

</xml_diff>